<commit_message>
more images for dataflow
</commit_message>
<xml_diff>
--- a/doc/project_management/Images_and_DataFlow.pptx
+++ b/doc/project_management/Images_and_DataFlow.pptx
@@ -10,7 +10,8 @@
     <p:sldId id="259" r:id="rId4"/>
     <p:sldId id="260" r:id="rId5"/>
     <p:sldId id="261" r:id="rId6"/>
-    <p:sldId id="262" r:id="rId7"/>
+    <p:sldId id="263" r:id="rId7"/>
+    <p:sldId id="262" r:id="rId8"/>
   </p:sldIdLst>
   <p:sldSz cx="12192000" cy="6858000"/>
   <p:notesSz cx="6858000" cy="9144000"/>
@@ -5109,7 +5110,7 @@
             <a:pPr algn="ctr"/>
             <a:r>
               <a:rPr lang="en-US" dirty="0"/>
-              <a:t>Model</a:t>
+              <a:t>Tuner</a:t>
             </a:r>
           </a:p>
           <a:p>
@@ -5165,7 +5166,7 @@
             <a:pPr algn="ctr"/>
             <a:r>
               <a:rPr lang="en-US" dirty="0"/>
-              <a:t>Tuner</a:t>
+              <a:t>Model</a:t>
             </a:r>
           </a:p>
           <a:p>
@@ -6278,7 +6279,7 @@
             <a:pPr algn="ctr"/>
             <a:r>
               <a:rPr lang="en-US" sz="1100" dirty="0"/>
-              <a:t>Model</a:t>
+              <a:t>Tuner</a:t>
             </a:r>
           </a:p>
           <a:p>
@@ -6334,7 +6335,7 @@
             <a:pPr algn="ctr"/>
             <a:r>
               <a:rPr lang="en-US" sz="1100" dirty="0"/>
-              <a:t>Tuner</a:t>
+              <a:t>Model</a:t>
             </a:r>
           </a:p>
           <a:p>
@@ -6465,7 +6466,7 @@
         </p:nvSpPr>
         <p:spPr>
           <a:xfrm>
-            <a:off x="8190688" y="4852062"/>
+            <a:off x="9213419" y="4493230"/>
             <a:ext cx="2136431" cy="797668"/>
           </a:xfrm>
           <a:prstGeom prst="flowChartInputOutput">
@@ -6671,13 +6672,13 @@
           <p:nvPr/>
         </p:nvCxnSpPr>
         <p:spPr>
-          <a:xfrm flipH="1">
-            <a:off x="10113476" y="3521496"/>
-            <a:ext cx="575377" cy="1729400"/>
+          <a:xfrm>
+            <a:off x="10688853" y="3521496"/>
+            <a:ext cx="447354" cy="1370568"/>
           </a:xfrm>
           <a:prstGeom prst="bentConnector3">
             <a:avLst>
-              <a:gd name="adj1" fmla="val -39730"/>
+              <a:gd name="adj1" fmla="val 198858"/>
             </a:avLst>
           </a:prstGeom>
           <a:ln w="76200">
@@ -6714,18 +6715,20 @@
           </p:cNvPr>
           <p:cNvCxnSpPr>
             <a:cxnSpLocks/>
-            <a:stCxn id="11" idx="2"/>
+            <a:stCxn id="11" idx="4"/>
             <a:endCxn id="121" idx="2"/>
           </p:cNvCxnSpPr>
           <p:nvPr/>
         </p:nvCxnSpPr>
         <p:spPr>
-          <a:xfrm rot="10800000">
-            <a:off x="1949373" y="4009944"/>
-            <a:ext cx="6454958" cy="1240953"/>
-          </a:xfrm>
-          <a:prstGeom prst="bentConnector2">
-            <a:avLst/>
+          <a:xfrm rot="5400000" flipH="1">
+            <a:off x="5475026" y="484290"/>
+            <a:ext cx="1280955" cy="8332262"/>
+          </a:xfrm>
+          <a:prstGeom prst="bentConnector3">
+            <a:avLst>
+              <a:gd name="adj1" fmla="val -17846"/>
+            </a:avLst>
           </a:prstGeom>
           <a:ln w="76200">
             <a:solidFill>
@@ -6810,13 +6813,12 @@
           </p:cNvPr>
           <p:cNvCxnSpPr>
             <a:cxnSpLocks/>
-            <a:endCxn id="38" idx="0"/>
           </p:cNvCxnSpPr>
           <p:nvPr/>
         </p:nvCxnSpPr>
         <p:spPr>
           <a:xfrm>
-            <a:off x="10911179" y="5250896"/>
+            <a:off x="10263556" y="5290898"/>
             <a:ext cx="0" cy="444312"/>
           </a:xfrm>
           <a:prstGeom prst="straightConnector1">
@@ -7789,6 +7791,194 @@
             <a:avLst>
               <a:gd name="adj1" fmla="val 99844"/>
             </a:avLst>
+          </a:prstGeom>
+          <a:ln w="53975">
+            <a:solidFill>
+              <a:schemeClr val="accent4">
+                <a:lumMod val="75000"/>
+              </a:schemeClr>
+            </a:solidFill>
+            <a:prstDash val="sysDot"/>
+            <a:tailEnd type="triangle"/>
+          </a:ln>
+        </p:spPr>
+        <p:style>
+          <a:lnRef idx="1">
+            <a:schemeClr val="accent1"/>
+          </a:lnRef>
+          <a:fillRef idx="0">
+            <a:schemeClr val="accent1"/>
+          </a:fillRef>
+          <a:effectRef idx="0">
+            <a:schemeClr val="accent1"/>
+          </a:effectRef>
+          <a:fontRef idx="minor">
+            <a:schemeClr val="tx1"/>
+          </a:fontRef>
+        </p:style>
+      </p:cxnSp>
+      <p:cxnSp>
+        <p:nvCxnSpPr>
+          <p:cNvPr id="201" name="Connector: Elbow 200">
+            <a:extLst>
+              <a:ext uri="{FF2B5EF4-FFF2-40B4-BE49-F238E27FC236}">
+                <a16:creationId xmlns:a16="http://schemas.microsoft.com/office/drawing/2014/main" id="{A2E5B569-6486-4A87-9A27-47832A7D3542}"/>
+              </a:ext>
+            </a:extLst>
+          </p:cNvPr>
+          <p:cNvCxnSpPr>
+            <a:cxnSpLocks/>
+            <a:stCxn id="114" idx="2"/>
+            <a:endCxn id="206" idx="0"/>
+          </p:cNvCxnSpPr>
+          <p:nvPr/>
+        </p:nvCxnSpPr>
+        <p:spPr>
+          <a:xfrm rot="16200000" flipH="1">
+            <a:off x="6836468" y="3817125"/>
+            <a:ext cx="555485" cy="488584"/>
+          </a:xfrm>
+          <a:prstGeom prst="bentConnector3">
+            <a:avLst>
+              <a:gd name="adj1" fmla="val 50000"/>
+            </a:avLst>
+          </a:prstGeom>
+          <a:ln w="53975">
+            <a:solidFill>
+              <a:schemeClr val="accent4">
+                <a:lumMod val="75000"/>
+              </a:schemeClr>
+            </a:solidFill>
+            <a:prstDash val="sysDot"/>
+            <a:tailEnd type="triangle"/>
+          </a:ln>
+        </p:spPr>
+        <p:style>
+          <a:lnRef idx="1">
+            <a:schemeClr val="accent1"/>
+          </a:lnRef>
+          <a:fillRef idx="0">
+            <a:schemeClr val="accent1"/>
+          </a:fillRef>
+          <a:effectRef idx="0">
+            <a:schemeClr val="accent1"/>
+          </a:effectRef>
+          <a:fontRef idx="minor">
+            <a:schemeClr val="tx1"/>
+          </a:fontRef>
+        </p:style>
+      </p:cxnSp>
+      <p:sp>
+        <p:nvSpPr>
+          <p:cNvPr id="206" name="Flowchart: Multidocument 205">
+            <a:extLst>
+              <a:ext uri="{FF2B5EF4-FFF2-40B4-BE49-F238E27FC236}">
+                <a16:creationId xmlns:a16="http://schemas.microsoft.com/office/drawing/2014/main" id="{8A64C23A-C172-4E3E-9CCE-55D10EBE215E}"/>
+              </a:ext>
+            </a:extLst>
+          </p:cNvPr>
+          <p:cNvSpPr/>
+          <p:nvPr/>
+        </p:nvSpPr>
+        <p:spPr>
+          <a:xfrm>
+            <a:off x="6323731" y="4339160"/>
+            <a:ext cx="1819230" cy="904674"/>
+          </a:xfrm>
+          <a:prstGeom prst="flowChartMultidocument">
+            <a:avLst/>
+          </a:prstGeom>
+          <a:solidFill>
+            <a:srgbClr val="FFE699"/>
+          </a:solidFill>
+        </p:spPr>
+        <p:style>
+          <a:lnRef idx="2">
+            <a:schemeClr val="accent1">
+              <a:shade val="50000"/>
+            </a:schemeClr>
+          </a:lnRef>
+          <a:fillRef idx="1">
+            <a:schemeClr val="accent1"/>
+          </a:fillRef>
+          <a:effectRef idx="0">
+            <a:schemeClr val="accent1"/>
+          </a:effectRef>
+          <a:fontRef idx="minor">
+            <a:schemeClr val="lt1"/>
+          </a:fontRef>
+        </p:style>
+        <p:txBody>
+          <a:bodyPr rot="0" spcFirstLastPara="0" vertOverflow="overflow" horzOverflow="overflow" vert="horz" wrap="square" lIns="91440" tIns="45720" rIns="91440" bIns="45720" numCol="1" spcCol="0" rtlCol="0" fromWordArt="0" anchor="ctr" anchorCtr="0" forceAA="0" compatLnSpc="1">
+            <a:prstTxWarp prst="textNoShape">
+              <a:avLst/>
+            </a:prstTxWarp>
+            <a:noAutofit/>
+          </a:bodyPr>
+          <a:lstStyle/>
+          <a:p>
+            <a:pPr algn="ctr"/>
+            <a:r>
+              <a:rPr lang="en-US" sz="1100" dirty="0">
+                <a:ln w="0"/>
+                <a:solidFill>
+                  <a:schemeClr val="tx1"/>
+                </a:solidFill>
+                <a:effectLst>
+                  <a:outerShdw blurRad="38100" dist="19050" dir="2700000" algn="tl" rotWithShape="0">
+                    <a:schemeClr val="dk1">
+                      <a:alpha val="40000"/>
+                    </a:schemeClr>
+                  </a:outerShdw>
+                </a:effectLst>
+              </a:rPr>
+              <a:t>Optional? Handoff as</a:t>
+            </a:r>
+          </a:p>
+          <a:p>
+            <a:pPr algn="ctr"/>
+            <a:r>
+              <a:rPr lang="en-US" sz="1100" dirty="0">
+                <a:ln w="0"/>
+                <a:solidFill>
+                  <a:schemeClr val="tx1"/>
+                </a:solidFill>
+                <a:effectLst>
+                  <a:outerShdw blurRad="38100" dist="19050" dir="2700000" algn="tl" rotWithShape="0">
+                    <a:schemeClr val="dk1">
+                      <a:alpha val="40000"/>
+                    </a:schemeClr>
+                  </a:outerShdw>
+                </a:effectLst>
+              </a:rPr>
+              <a:t>Transformed PNG Images</a:t>
+            </a:r>
+          </a:p>
+        </p:txBody>
+      </p:sp>
+      <p:cxnSp>
+        <p:nvCxnSpPr>
+          <p:cNvPr id="209" name="Connector: Elbow 208">
+            <a:extLst>
+              <a:ext uri="{FF2B5EF4-FFF2-40B4-BE49-F238E27FC236}">
+                <a16:creationId xmlns:a16="http://schemas.microsoft.com/office/drawing/2014/main" id="{513224BB-32CD-498D-BAE2-AE373C7C71AB}"/>
+              </a:ext>
+            </a:extLst>
+          </p:cNvPr>
+          <p:cNvCxnSpPr>
+            <a:cxnSpLocks/>
+            <a:stCxn id="206" idx="3"/>
+            <a:endCxn id="9" idx="2"/>
+          </p:cNvCxnSpPr>
+          <p:nvPr/>
+        </p:nvCxnSpPr>
+        <p:spPr>
+          <a:xfrm flipV="1">
+            <a:off x="8142961" y="4118021"/>
+            <a:ext cx="810428" cy="673476"/>
+          </a:xfrm>
+          <a:prstGeom prst="bentConnector2">
+            <a:avLst/>
           </a:prstGeom>
           <a:ln w="53975">
             <a:solidFill>
@@ -7847,6 +8037,980 @@
       </p:grpSpPr>
       <p:sp>
         <p:nvSpPr>
+          <p:cNvPr id="3" name="Arrow: Pentagon 2">
+            <a:extLst>
+              <a:ext uri="{FF2B5EF4-FFF2-40B4-BE49-F238E27FC236}">
+                <a16:creationId xmlns:a16="http://schemas.microsoft.com/office/drawing/2014/main" id="{DEB13218-10F8-4088-9F29-54C4DDC0FC53}"/>
+              </a:ext>
+            </a:extLst>
+          </p:cNvPr>
+          <p:cNvSpPr/>
+          <p:nvPr/>
+        </p:nvSpPr>
+        <p:spPr>
+          <a:xfrm>
+            <a:off x="3091773" y="2480552"/>
+            <a:ext cx="3111234" cy="1887166"/>
+          </a:xfrm>
+          <a:prstGeom prst="homePlate">
+            <a:avLst/>
+          </a:prstGeom>
+          <a:solidFill>
+            <a:schemeClr val="accent4">
+              <a:lumMod val="40000"/>
+              <a:lumOff val="60000"/>
+            </a:schemeClr>
+          </a:solidFill>
+        </p:spPr>
+        <p:style>
+          <a:lnRef idx="2">
+            <a:schemeClr val="accent1">
+              <a:shade val="50000"/>
+            </a:schemeClr>
+          </a:lnRef>
+          <a:fillRef idx="1">
+            <a:schemeClr val="accent1"/>
+          </a:fillRef>
+          <a:effectRef idx="0">
+            <a:schemeClr val="accent1"/>
+          </a:effectRef>
+          <a:fontRef idx="minor">
+            <a:schemeClr val="lt1"/>
+          </a:fontRef>
+        </p:style>
+        <p:txBody>
+          <a:bodyPr rtlCol="0" anchor="ctr"/>
+          <a:lstStyle/>
+          <a:p>
+            <a:pPr algn="ctr"/>
+            <a:r>
+              <a:rPr lang="en-US" b="1" dirty="0">
+                <a:ln w="0"/>
+                <a:solidFill>
+                  <a:schemeClr val="tx1"/>
+                </a:solidFill>
+                <a:effectLst>
+                  <a:outerShdw blurRad="38100" dist="19050" dir="2700000" algn="tl" rotWithShape="0">
+                    <a:schemeClr val="dk1">
+                      <a:alpha val="40000"/>
+                    </a:schemeClr>
+                  </a:outerShdw>
+                </a:effectLst>
+              </a:rPr>
+              <a:t>Data + Transformation</a:t>
+            </a:r>
+          </a:p>
+          <a:p>
+            <a:pPr algn="ctr"/>
+            <a:r>
+              <a:rPr lang="en-US" b="1" dirty="0">
+                <a:ln w="0"/>
+                <a:solidFill>
+                  <a:schemeClr val="tx1"/>
+                </a:solidFill>
+                <a:effectLst>
+                  <a:outerShdw blurRad="38100" dist="19050" dir="2700000" algn="tl" rotWithShape="0">
+                    <a:schemeClr val="dk1">
+                      <a:alpha val="40000"/>
+                    </a:schemeClr>
+                  </a:outerShdw>
+                </a:effectLst>
+              </a:rPr>
+              <a:t>Wrapping Function</a:t>
+            </a:r>
+          </a:p>
+        </p:txBody>
+      </p:sp>
+      <p:sp>
+        <p:nvSpPr>
+          <p:cNvPr id="4" name="Flowchart: Document 3">
+            <a:extLst>
+              <a:ext uri="{FF2B5EF4-FFF2-40B4-BE49-F238E27FC236}">
+                <a16:creationId xmlns:a16="http://schemas.microsoft.com/office/drawing/2014/main" id="{608C4DCD-0402-4108-A8FA-EDADEE98788B}"/>
+              </a:ext>
+            </a:extLst>
+          </p:cNvPr>
+          <p:cNvSpPr/>
+          <p:nvPr/>
+        </p:nvSpPr>
+        <p:spPr>
+          <a:xfrm>
+            <a:off x="1964988" y="1157422"/>
+            <a:ext cx="1692613" cy="797668"/>
+          </a:xfrm>
+          <a:prstGeom prst="flowChartDocument">
+            <a:avLst/>
+          </a:prstGeom>
+        </p:spPr>
+        <p:style>
+          <a:lnRef idx="2">
+            <a:schemeClr val="accent1">
+              <a:shade val="50000"/>
+            </a:schemeClr>
+          </a:lnRef>
+          <a:fillRef idx="1">
+            <a:schemeClr val="accent1"/>
+          </a:fillRef>
+          <a:effectRef idx="0">
+            <a:schemeClr val="accent1"/>
+          </a:effectRef>
+          <a:fontRef idx="minor">
+            <a:schemeClr val="lt1"/>
+          </a:fontRef>
+        </p:style>
+        <p:txBody>
+          <a:bodyPr rtlCol="0" anchor="ctr"/>
+          <a:lstStyle/>
+          <a:p>
+            <a:pPr algn="ctr"/>
+            <a:r>
+              <a:rPr lang="en-US" dirty="0"/>
+              <a:t>Transform</a:t>
+            </a:r>
+          </a:p>
+          <a:p>
+            <a:pPr algn="ctr"/>
+            <a:r>
+              <a:rPr lang="en-US" dirty="0"/>
+              <a:t>Configuration</a:t>
+            </a:r>
+          </a:p>
+        </p:txBody>
+      </p:sp>
+      <p:sp>
+        <p:nvSpPr>
+          <p:cNvPr id="5" name="Flowchart: Stored Data 4">
+            <a:extLst>
+              <a:ext uri="{FF2B5EF4-FFF2-40B4-BE49-F238E27FC236}">
+                <a16:creationId xmlns:a16="http://schemas.microsoft.com/office/drawing/2014/main" id="{1CDF9E11-B36F-4FEE-A1FD-A6F0E87C98B4}"/>
+              </a:ext>
+            </a:extLst>
+          </p:cNvPr>
+          <p:cNvSpPr/>
+          <p:nvPr/>
+        </p:nvSpPr>
+        <p:spPr>
+          <a:xfrm flipH="1">
+            <a:off x="7049308" y="2480552"/>
+            <a:ext cx="3459803" cy="1887166"/>
+          </a:xfrm>
+          <a:prstGeom prst="flowChartOnlineStorage">
+            <a:avLst/>
+          </a:prstGeom>
+          <a:solidFill>
+            <a:srgbClr val="B685DB"/>
+          </a:solidFill>
+        </p:spPr>
+        <p:style>
+          <a:lnRef idx="2">
+            <a:schemeClr val="accent1">
+              <a:shade val="50000"/>
+            </a:schemeClr>
+          </a:lnRef>
+          <a:fillRef idx="1">
+            <a:schemeClr val="accent1"/>
+          </a:fillRef>
+          <a:effectRef idx="0">
+            <a:schemeClr val="accent1"/>
+          </a:effectRef>
+          <a:fontRef idx="minor">
+            <a:schemeClr val="lt1"/>
+          </a:fontRef>
+        </p:style>
+        <p:txBody>
+          <a:bodyPr rot="0" spcFirstLastPara="0" vertOverflow="overflow" horzOverflow="overflow" vert="horz" wrap="square" lIns="91440" tIns="45720" rIns="91440" bIns="45720" numCol="1" spcCol="0" rtlCol="0" fromWordArt="0" anchor="ctr" anchorCtr="0" forceAA="0" compatLnSpc="1">
+            <a:prstTxWarp prst="textNoShape">
+              <a:avLst/>
+            </a:prstTxWarp>
+            <a:noAutofit/>
+          </a:bodyPr>
+          <a:lstStyle/>
+          <a:p>
+            <a:pPr algn="ctr"/>
+            <a:r>
+              <a:rPr lang="en-US" dirty="0">
+                <a:ln w="0"/>
+                <a:solidFill>
+                  <a:schemeClr val="tx1"/>
+                </a:solidFill>
+                <a:effectLst>
+                  <a:outerShdw blurRad="38100" dist="19050" dir="2700000" algn="tl" rotWithShape="0">
+                    <a:schemeClr val="dk1">
+                      <a:alpha val="40000"/>
+                    </a:schemeClr>
+                  </a:outerShdw>
+                </a:effectLst>
+              </a:rPr>
+              <a:t>Classification</a:t>
+            </a:r>
+          </a:p>
+          <a:p>
+            <a:pPr algn="ctr"/>
+            <a:r>
+              <a:rPr lang="en-US" dirty="0">
+                <a:ln w="0"/>
+                <a:solidFill>
+                  <a:schemeClr val="tx1"/>
+                </a:solidFill>
+                <a:effectLst>
+                  <a:outerShdw blurRad="38100" dist="19050" dir="2700000" algn="tl" rotWithShape="0">
+                    <a:schemeClr val="dk1">
+                      <a:alpha val="40000"/>
+                    </a:schemeClr>
+                  </a:outerShdw>
+                </a:effectLst>
+              </a:rPr>
+              <a:t>Wrapping Function</a:t>
+            </a:r>
+          </a:p>
+        </p:txBody>
+      </p:sp>
+      <p:sp>
+        <p:nvSpPr>
+          <p:cNvPr id="6" name="Flowchart: Document 5">
+            <a:extLst>
+              <a:ext uri="{FF2B5EF4-FFF2-40B4-BE49-F238E27FC236}">
+                <a16:creationId xmlns:a16="http://schemas.microsoft.com/office/drawing/2014/main" id="{A72DEB59-BBB3-40EE-B0BD-3E8397015455}"/>
+              </a:ext>
+            </a:extLst>
+          </p:cNvPr>
+          <p:cNvSpPr/>
+          <p:nvPr/>
+        </p:nvSpPr>
+        <p:spPr>
+          <a:xfrm>
+            <a:off x="5845101" y="1169834"/>
+            <a:ext cx="1692613" cy="797668"/>
+          </a:xfrm>
+          <a:prstGeom prst="flowChartDocument">
+            <a:avLst/>
+          </a:prstGeom>
+        </p:spPr>
+        <p:style>
+          <a:lnRef idx="2">
+            <a:schemeClr val="accent1">
+              <a:shade val="50000"/>
+            </a:schemeClr>
+          </a:lnRef>
+          <a:fillRef idx="1">
+            <a:schemeClr val="accent1"/>
+          </a:fillRef>
+          <a:effectRef idx="0">
+            <a:schemeClr val="accent1"/>
+          </a:effectRef>
+          <a:fontRef idx="minor">
+            <a:schemeClr val="lt1"/>
+          </a:fontRef>
+        </p:style>
+        <p:txBody>
+          <a:bodyPr rtlCol="0" anchor="ctr"/>
+          <a:lstStyle/>
+          <a:p>
+            <a:pPr algn="ctr"/>
+            <a:r>
+              <a:rPr lang="en-US" dirty="0"/>
+              <a:t>Tuner</a:t>
+            </a:r>
+          </a:p>
+          <a:p>
+            <a:pPr algn="ctr"/>
+            <a:r>
+              <a:rPr lang="en-US" dirty="0"/>
+              <a:t>Configuration</a:t>
+            </a:r>
+          </a:p>
+        </p:txBody>
+      </p:sp>
+      <p:sp>
+        <p:nvSpPr>
+          <p:cNvPr id="7" name="Flowchart: Document 6">
+            <a:extLst>
+              <a:ext uri="{FF2B5EF4-FFF2-40B4-BE49-F238E27FC236}">
+                <a16:creationId xmlns:a16="http://schemas.microsoft.com/office/drawing/2014/main" id="{83738BF8-F105-40D0-A935-B3923010B06B}"/>
+              </a:ext>
+            </a:extLst>
+          </p:cNvPr>
+          <p:cNvSpPr/>
+          <p:nvPr/>
+        </p:nvSpPr>
+        <p:spPr>
+          <a:xfrm>
+            <a:off x="7951546" y="1171647"/>
+            <a:ext cx="1692613" cy="797668"/>
+          </a:xfrm>
+          <a:prstGeom prst="flowChartDocument">
+            <a:avLst/>
+          </a:prstGeom>
+        </p:spPr>
+        <p:style>
+          <a:lnRef idx="2">
+            <a:schemeClr val="accent1">
+              <a:shade val="50000"/>
+            </a:schemeClr>
+          </a:lnRef>
+          <a:fillRef idx="1">
+            <a:schemeClr val="accent1"/>
+          </a:fillRef>
+          <a:effectRef idx="0">
+            <a:schemeClr val="accent1"/>
+          </a:effectRef>
+          <a:fontRef idx="minor">
+            <a:schemeClr val="lt1"/>
+          </a:fontRef>
+        </p:style>
+        <p:txBody>
+          <a:bodyPr rtlCol="0" anchor="ctr"/>
+          <a:lstStyle/>
+          <a:p>
+            <a:pPr algn="ctr"/>
+            <a:r>
+              <a:rPr lang="en-US" dirty="0"/>
+              <a:t>Model</a:t>
+            </a:r>
+          </a:p>
+          <a:p>
+            <a:pPr algn="ctr"/>
+            <a:r>
+              <a:rPr lang="en-US" dirty="0"/>
+              <a:t>Configuration</a:t>
+            </a:r>
+          </a:p>
+        </p:txBody>
+      </p:sp>
+      <p:sp>
+        <p:nvSpPr>
+          <p:cNvPr id="8" name="Flowchart: Multidocument 7">
+            <a:extLst>
+              <a:ext uri="{FF2B5EF4-FFF2-40B4-BE49-F238E27FC236}">
+                <a16:creationId xmlns:a16="http://schemas.microsoft.com/office/drawing/2014/main" id="{70AEF4D8-A8DE-4CDD-99DD-1527444B765E}"/>
+              </a:ext>
+            </a:extLst>
+          </p:cNvPr>
+          <p:cNvSpPr/>
+          <p:nvPr/>
+        </p:nvSpPr>
+        <p:spPr>
+          <a:xfrm>
+            <a:off x="204281" y="2519461"/>
+            <a:ext cx="1760707" cy="1819072"/>
+          </a:xfrm>
+          <a:prstGeom prst="flowChartMultidocument">
+            <a:avLst/>
+          </a:prstGeom>
+        </p:spPr>
+        <p:style>
+          <a:lnRef idx="2">
+            <a:schemeClr val="accent1">
+              <a:shade val="50000"/>
+            </a:schemeClr>
+          </a:lnRef>
+          <a:fillRef idx="1">
+            <a:schemeClr val="accent1"/>
+          </a:fillRef>
+          <a:effectRef idx="0">
+            <a:schemeClr val="accent1"/>
+          </a:effectRef>
+          <a:fontRef idx="minor">
+            <a:schemeClr val="lt1"/>
+          </a:fontRef>
+        </p:style>
+        <p:txBody>
+          <a:bodyPr rtlCol="0" anchor="ctr"/>
+          <a:lstStyle/>
+          <a:p>
+            <a:pPr algn="ctr"/>
+            <a:r>
+              <a:rPr lang="en-US" dirty="0"/>
+              <a:t>Raw Data</a:t>
+            </a:r>
+          </a:p>
+          <a:p>
+            <a:pPr algn="ctr"/>
+            <a:r>
+              <a:rPr lang="en-US" dirty="0"/>
+              <a:t>CSV Files</a:t>
+            </a:r>
+          </a:p>
+        </p:txBody>
+      </p:sp>
+      <p:sp>
+        <p:nvSpPr>
+          <p:cNvPr id="9" name="Arrow: Right 8">
+            <a:extLst>
+              <a:ext uri="{FF2B5EF4-FFF2-40B4-BE49-F238E27FC236}">
+                <a16:creationId xmlns:a16="http://schemas.microsoft.com/office/drawing/2014/main" id="{A20F0100-CA31-4321-91A3-9B5011A5AC2D}"/>
+              </a:ext>
+            </a:extLst>
+          </p:cNvPr>
+          <p:cNvSpPr/>
+          <p:nvPr/>
+        </p:nvSpPr>
+        <p:spPr>
+          <a:xfrm>
+            <a:off x="6279401" y="2575396"/>
+            <a:ext cx="1225685" cy="1697477"/>
+          </a:xfrm>
+          <a:prstGeom prst="rightArrow">
+            <a:avLst/>
+          </a:prstGeom>
+        </p:spPr>
+        <p:style>
+          <a:lnRef idx="2">
+            <a:schemeClr val="accent1">
+              <a:shade val="50000"/>
+            </a:schemeClr>
+          </a:lnRef>
+          <a:fillRef idx="1">
+            <a:schemeClr val="accent1"/>
+          </a:fillRef>
+          <a:effectRef idx="0">
+            <a:schemeClr val="accent1"/>
+          </a:effectRef>
+          <a:fontRef idx="minor">
+            <a:schemeClr val="lt1"/>
+          </a:fontRef>
+        </p:style>
+        <p:txBody>
+          <a:bodyPr rtlCol="0" anchor="ctr"/>
+          <a:lstStyle/>
+          <a:p>
+            <a:pPr algn="ctr"/>
+            <a:r>
+              <a:rPr lang="en-US" dirty="0"/>
+              <a:t>Image List-of-Tuples</a:t>
+            </a:r>
+          </a:p>
+        </p:txBody>
+      </p:sp>
+      <p:sp>
+        <p:nvSpPr>
+          <p:cNvPr id="11" name="Flowchart: Data 10">
+            <a:extLst>
+              <a:ext uri="{FF2B5EF4-FFF2-40B4-BE49-F238E27FC236}">
+                <a16:creationId xmlns:a16="http://schemas.microsoft.com/office/drawing/2014/main" id="{7EC87890-3F53-4C56-99A8-788FA5AFF176}"/>
+              </a:ext>
+            </a:extLst>
+          </p:cNvPr>
+          <p:cNvSpPr/>
+          <p:nvPr/>
+        </p:nvSpPr>
+        <p:spPr>
+          <a:xfrm>
+            <a:off x="3788107" y="4893180"/>
+            <a:ext cx="5009745" cy="953311"/>
+          </a:xfrm>
+          <a:prstGeom prst="flowChartInputOutput">
+            <a:avLst/>
+          </a:prstGeom>
+        </p:spPr>
+        <p:style>
+          <a:lnRef idx="2">
+            <a:schemeClr val="accent1">
+              <a:shade val="50000"/>
+            </a:schemeClr>
+          </a:lnRef>
+          <a:fillRef idx="1">
+            <a:schemeClr val="accent1"/>
+          </a:fillRef>
+          <a:effectRef idx="0">
+            <a:schemeClr val="accent1"/>
+          </a:effectRef>
+          <a:fontRef idx="minor">
+            <a:schemeClr val="lt1"/>
+          </a:fontRef>
+        </p:style>
+        <p:txBody>
+          <a:bodyPr rtlCol="0" anchor="ctr"/>
+          <a:lstStyle/>
+          <a:p>
+            <a:pPr algn="ctr"/>
+            <a:r>
+              <a:rPr lang="en-US" dirty="0"/>
+              <a:t>Report, Analysis, and</a:t>
+            </a:r>
+            <a:br>
+              <a:rPr lang="en-US" dirty="0"/>
+            </a:br>
+            <a:r>
+              <a:rPr lang="en-US" dirty="0"/>
+              <a:t>Loop to Next Transformation</a:t>
+            </a:r>
+          </a:p>
+        </p:txBody>
+      </p:sp>
+      <p:cxnSp>
+        <p:nvCxnSpPr>
+          <p:cNvPr id="13" name="Connector: Elbow 12">
+            <a:extLst>
+              <a:ext uri="{FF2B5EF4-FFF2-40B4-BE49-F238E27FC236}">
+                <a16:creationId xmlns:a16="http://schemas.microsoft.com/office/drawing/2014/main" id="{A1B4B8D2-A12C-488D-80D9-BD11D16F463E}"/>
+              </a:ext>
+            </a:extLst>
+          </p:cNvPr>
+          <p:cNvCxnSpPr>
+            <a:cxnSpLocks/>
+            <a:stCxn id="4" idx="2"/>
+            <a:endCxn id="3" idx="0"/>
+          </p:cNvCxnSpPr>
+          <p:nvPr/>
+        </p:nvCxnSpPr>
+        <p:spPr>
+          <a:xfrm rot="16200000" flipH="1">
+            <a:off x="3204349" y="1509301"/>
+            <a:ext cx="578197" cy="1364304"/>
+          </a:xfrm>
+          <a:prstGeom prst="bentConnector3">
+            <a:avLst>
+              <a:gd name="adj1" fmla="val 50000"/>
+            </a:avLst>
+          </a:prstGeom>
+          <a:ln w="76200">
+            <a:solidFill>
+              <a:srgbClr val="7030A0"/>
+            </a:solidFill>
+            <a:prstDash val="sysDot"/>
+            <a:tailEnd type="triangle"/>
+          </a:ln>
+        </p:spPr>
+        <p:style>
+          <a:lnRef idx="1">
+            <a:schemeClr val="accent1"/>
+          </a:lnRef>
+          <a:fillRef idx="0">
+            <a:schemeClr val="accent1"/>
+          </a:fillRef>
+          <a:effectRef idx="0">
+            <a:schemeClr val="accent1"/>
+          </a:effectRef>
+          <a:fontRef idx="minor">
+            <a:schemeClr val="tx1"/>
+          </a:fontRef>
+        </p:style>
+      </p:cxnSp>
+      <p:cxnSp>
+        <p:nvCxnSpPr>
+          <p:cNvPr id="16" name="Connector: Elbow 15">
+            <a:extLst>
+              <a:ext uri="{FF2B5EF4-FFF2-40B4-BE49-F238E27FC236}">
+                <a16:creationId xmlns:a16="http://schemas.microsoft.com/office/drawing/2014/main" id="{1375FDC8-1457-42F3-9E80-EC11BE8DA508}"/>
+              </a:ext>
+            </a:extLst>
+          </p:cNvPr>
+          <p:cNvCxnSpPr>
+            <a:cxnSpLocks/>
+            <a:stCxn id="6" idx="2"/>
+            <a:endCxn id="5" idx="0"/>
+          </p:cNvCxnSpPr>
+          <p:nvPr/>
+        </p:nvCxnSpPr>
+        <p:spPr>
+          <a:xfrm rot="16200000" flipH="1">
+            <a:off x="7452416" y="1153758"/>
+            <a:ext cx="565785" cy="2087801"/>
+          </a:xfrm>
+          <a:prstGeom prst="bentConnector3">
+            <a:avLst>
+              <a:gd name="adj1" fmla="val 50000"/>
+            </a:avLst>
+          </a:prstGeom>
+          <a:ln w="76200">
+            <a:solidFill>
+              <a:srgbClr val="7030A0"/>
+            </a:solidFill>
+            <a:prstDash val="sysDot"/>
+            <a:tailEnd type="triangle"/>
+          </a:ln>
+        </p:spPr>
+        <p:style>
+          <a:lnRef idx="1">
+            <a:schemeClr val="accent1"/>
+          </a:lnRef>
+          <a:fillRef idx="0">
+            <a:schemeClr val="accent1"/>
+          </a:fillRef>
+          <a:effectRef idx="0">
+            <a:schemeClr val="accent1"/>
+          </a:effectRef>
+          <a:fontRef idx="minor">
+            <a:schemeClr val="tx1"/>
+          </a:fontRef>
+        </p:style>
+      </p:cxnSp>
+      <p:cxnSp>
+        <p:nvCxnSpPr>
+          <p:cNvPr id="19" name="Connector: Elbow 18">
+            <a:extLst>
+              <a:ext uri="{FF2B5EF4-FFF2-40B4-BE49-F238E27FC236}">
+                <a16:creationId xmlns:a16="http://schemas.microsoft.com/office/drawing/2014/main" id="{AE9BCAB5-6196-4B0A-9523-F192B2C4ED25}"/>
+              </a:ext>
+            </a:extLst>
+          </p:cNvPr>
+          <p:cNvCxnSpPr>
+            <a:cxnSpLocks/>
+            <a:stCxn id="7" idx="2"/>
+            <a:endCxn id="5" idx="0"/>
+          </p:cNvCxnSpPr>
+          <p:nvPr/>
+        </p:nvCxnSpPr>
+        <p:spPr>
+          <a:xfrm rot="5400000">
+            <a:off x="8506545" y="2189244"/>
+            <a:ext cx="563972" cy="18644"/>
+          </a:xfrm>
+          <a:prstGeom prst="bentConnector3">
+            <a:avLst>
+              <a:gd name="adj1" fmla="val 50000"/>
+            </a:avLst>
+          </a:prstGeom>
+          <a:ln w="76200">
+            <a:solidFill>
+              <a:srgbClr val="7030A0"/>
+            </a:solidFill>
+            <a:prstDash val="sysDot"/>
+            <a:tailEnd type="triangle"/>
+          </a:ln>
+        </p:spPr>
+        <p:style>
+          <a:lnRef idx="1">
+            <a:schemeClr val="accent1"/>
+          </a:lnRef>
+          <a:fillRef idx="0">
+            <a:schemeClr val="accent1"/>
+          </a:fillRef>
+          <a:effectRef idx="0">
+            <a:schemeClr val="accent1"/>
+          </a:effectRef>
+          <a:fontRef idx="minor">
+            <a:schemeClr val="tx1"/>
+          </a:fontRef>
+        </p:style>
+      </p:cxnSp>
+      <p:cxnSp>
+        <p:nvCxnSpPr>
+          <p:cNvPr id="28" name="Connector: Elbow 27">
+            <a:extLst>
+              <a:ext uri="{FF2B5EF4-FFF2-40B4-BE49-F238E27FC236}">
+                <a16:creationId xmlns:a16="http://schemas.microsoft.com/office/drawing/2014/main" id="{B191C72D-5F14-45D3-8143-688380F8F44E}"/>
+              </a:ext>
+            </a:extLst>
+          </p:cNvPr>
+          <p:cNvCxnSpPr>
+            <a:cxnSpLocks/>
+            <a:stCxn id="5" idx="1"/>
+            <a:endCxn id="11" idx="5"/>
+          </p:cNvCxnSpPr>
+          <p:nvPr/>
+        </p:nvCxnSpPr>
+        <p:spPr>
+          <a:xfrm flipH="1">
+            <a:off x="8296878" y="3424135"/>
+            <a:ext cx="2212233" cy="1945701"/>
+          </a:xfrm>
+          <a:prstGeom prst="bentConnector3">
+            <a:avLst>
+              <a:gd name="adj1" fmla="val -12971"/>
+            </a:avLst>
+          </a:prstGeom>
+          <a:ln w="76200">
+            <a:solidFill>
+              <a:srgbClr val="7030A0"/>
+            </a:solidFill>
+            <a:prstDash val="sysDot"/>
+            <a:tailEnd type="triangle"/>
+          </a:ln>
+        </p:spPr>
+        <p:style>
+          <a:lnRef idx="1">
+            <a:schemeClr val="accent1"/>
+          </a:lnRef>
+          <a:fillRef idx="0">
+            <a:schemeClr val="accent1"/>
+          </a:fillRef>
+          <a:effectRef idx="0">
+            <a:schemeClr val="accent1"/>
+          </a:effectRef>
+          <a:fontRef idx="minor">
+            <a:schemeClr val="tx1"/>
+          </a:fontRef>
+        </p:style>
+      </p:cxnSp>
+      <p:cxnSp>
+        <p:nvCxnSpPr>
+          <p:cNvPr id="31" name="Connector: Elbow 30">
+            <a:extLst>
+              <a:ext uri="{FF2B5EF4-FFF2-40B4-BE49-F238E27FC236}">
+                <a16:creationId xmlns:a16="http://schemas.microsoft.com/office/drawing/2014/main" id="{006EBA4C-F0C5-45E0-9AB9-7F92FAFF3C4C}"/>
+              </a:ext>
+            </a:extLst>
+          </p:cNvPr>
+          <p:cNvCxnSpPr>
+            <a:cxnSpLocks/>
+            <a:stCxn id="11" idx="2"/>
+            <a:endCxn id="3" idx="1"/>
+          </p:cNvCxnSpPr>
+          <p:nvPr/>
+        </p:nvCxnSpPr>
+        <p:spPr>
+          <a:xfrm rot="10800000">
+            <a:off x="3091774" y="3424136"/>
+            <a:ext cx="1197309" cy="1945701"/>
+          </a:xfrm>
+          <a:prstGeom prst="bentConnector3">
+            <a:avLst>
+              <a:gd name="adj1" fmla="val 152404"/>
+            </a:avLst>
+          </a:prstGeom>
+          <a:ln w="76200">
+            <a:solidFill>
+              <a:srgbClr val="7030A0"/>
+            </a:solidFill>
+            <a:prstDash val="sysDot"/>
+            <a:tailEnd type="triangle"/>
+          </a:ln>
+        </p:spPr>
+        <p:style>
+          <a:lnRef idx="1">
+            <a:schemeClr val="accent1"/>
+          </a:lnRef>
+          <a:fillRef idx="0">
+            <a:schemeClr val="accent1"/>
+          </a:fillRef>
+          <a:effectRef idx="0">
+            <a:schemeClr val="accent1"/>
+          </a:effectRef>
+          <a:fontRef idx="minor">
+            <a:schemeClr val="tx1"/>
+          </a:fontRef>
+        </p:style>
+      </p:cxnSp>
+      <p:sp>
+        <p:nvSpPr>
+          <p:cNvPr id="38" name="Flowchart: Document 37">
+            <a:extLst>
+              <a:ext uri="{FF2B5EF4-FFF2-40B4-BE49-F238E27FC236}">
+                <a16:creationId xmlns:a16="http://schemas.microsoft.com/office/drawing/2014/main" id="{49F7F1FB-C309-4940-B98A-A4E71EFE2278}"/>
+              </a:ext>
+            </a:extLst>
+          </p:cNvPr>
+          <p:cNvSpPr/>
+          <p:nvPr/>
+        </p:nvSpPr>
+        <p:spPr>
+          <a:xfrm>
+            <a:off x="9944895" y="5695207"/>
+            <a:ext cx="1692613" cy="797668"/>
+          </a:xfrm>
+          <a:prstGeom prst="flowChartDocument">
+            <a:avLst/>
+          </a:prstGeom>
+        </p:spPr>
+        <p:style>
+          <a:lnRef idx="2">
+            <a:schemeClr val="accent1">
+              <a:shade val="50000"/>
+            </a:schemeClr>
+          </a:lnRef>
+          <a:fillRef idx="1">
+            <a:schemeClr val="accent1"/>
+          </a:fillRef>
+          <a:effectRef idx="0">
+            <a:schemeClr val="accent1"/>
+          </a:effectRef>
+          <a:fontRef idx="minor">
+            <a:schemeClr val="lt1"/>
+          </a:fontRef>
+        </p:style>
+        <p:txBody>
+          <a:bodyPr rtlCol="0" anchor="ctr"/>
+          <a:lstStyle/>
+          <a:p>
+            <a:pPr algn="ctr"/>
+            <a:r>
+              <a:rPr lang="en-US" dirty="0"/>
+              <a:t>Report Output</a:t>
+            </a:r>
+          </a:p>
+        </p:txBody>
+      </p:sp>
+      <p:cxnSp>
+        <p:nvCxnSpPr>
+          <p:cNvPr id="41" name="Straight Arrow Connector 40">
+            <a:extLst>
+              <a:ext uri="{FF2B5EF4-FFF2-40B4-BE49-F238E27FC236}">
+                <a16:creationId xmlns:a16="http://schemas.microsoft.com/office/drawing/2014/main" id="{6EC3F2D9-88B6-44F9-8DA8-7E120AFF3562}"/>
+              </a:ext>
+            </a:extLst>
+          </p:cNvPr>
+          <p:cNvCxnSpPr>
+            <a:endCxn id="38" idx="0"/>
+          </p:cNvCxnSpPr>
+          <p:nvPr/>
+        </p:nvCxnSpPr>
+        <p:spPr>
+          <a:xfrm>
+            <a:off x="10791201" y="5369835"/>
+            <a:ext cx="1" cy="325372"/>
+          </a:xfrm>
+          <a:prstGeom prst="straightConnector1">
+            <a:avLst/>
+          </a:prstGeom>
+          <a:ln w="63500">
+            <a:solidFill>
+              <a:srgbClr val="7030A0"/>
+            </a:solidFill>
+            <a:tailEnd type="triangle"/>
+          </a:ln>
+        </p:spPr>
+        <p:style>
+          <a:lnRef idx="1">
+            <a:schemeClr val="accent1"/>
+          </a:lnRef>
+          <a:fillRef idx="0">
+            <a:schemeClr val="accent1"/>
+          </a:fillRef>
+          <a:effectRef idx="0">
+            <a:schemeClr val="accent1"/>
+          </a:effectRef>
+          <a:fontRef idx="minor">
+            <a:schemeClr val="tx1"/>
+          </a:fontRef>
+        </p:style>
+      </p:cxnSp>
+      <p:cxnSp>
+        <p:nvCxnSpPr>
+          <p:cNvPr id="47" name="Connector: Elbow 46">
+            <a:extLst>
+              <a:ext uri="{FF2B5EF4-FFF2-40B4-BE49-F238E27FC236}">
+                <a16:creationId xmlns:a16="http://schemas.microsoft.com/office/drawing/2014/main" id="{723BCEE6-4DCC-47AF-ABDA-527764B55CF8}"/>
+              </a:ext>
+            </a:extLst>
+          </p:cNvPr>
+          <p:cNvCxnSpPr>
+            <a:cxnSpLocks/>
+            <a:stCxn id="8" idx="3"/>
+            <a:endCxn id="3" idx="1"/>
+          </p:cNvCxnSpPr>
+          <p:nvPr/>
+        </p:nvCxnSpPr>
+        <p:spPr>
+          <a:xfrm flipV="1">
+            <a:off x="1964988" y="3424135"/>
+            <a:ext cx="1126785" cy="4862"/>
+          </a:xfrm>
+          <a:prstGeom prst="bentConnector3">
+            <a:avLst>
+              <a:gd name="adj1" fmla="val 50000"/>
+            </a:avLst>
+          </a:prstGeom>
+          <a:ln w="76200">
+            <a:solidFill>
+              <a:srgbClr val="7030A0"/>
+            </a:solidFill>
+            <a:prstDash val="sysDot"/>
+            <a:tailEnd type="triangle"/>
+          </a:ln>
+        </p:spPr>
+        <p:style>
+          <a:lnRef idx="1">
+            <a:schemeClr val="accent1"/>
+          </a:lnRef>
+          <a:fillRef idx="0">
+            <a:schemeClr val="accent1"/>
+          </a:fillRef>
+          <a:effectRef idx="0">
+            <a:schemeClr val="accent1"/>
+          </a:effectRef>
+          <a:fontRef idx="minor">
+            <a:schemeClr val="tx1"/>
+          </a:fontRef>
+        </p:style>
+      </p:cxnSp>
+      <p:sp>
+        <p:nvSpPr>
+          <p:cNvPr id="55" name="Title 1">
+            <a:extLst>
+              <a:ext uri="{FF2B5EF4-FFF2-40B4-BE49-F238E27FC236}">
+                <a16:creationId xmlns:a16="http://schemas.microsoft.com/office/drawing/2014/main" id="{7D31CA0F-3A3F-46EE-A3D5-7E99F27A9FEE}"/>
+              </a:ext>
+            </a:extLst>
+          </p:cNvPr>
+          <p:cNvSpPr txBox="1">
+            <a:spLocks/>
+          </p:cNvSpPr>
+          <p:nvPr/>
+        </p:nvSpPr>
+        <p:spPr>
+          <a:xfrm>
+            <a:off x="838200" y="1"/>
+            <a:ext cx="10515600" cy="797668"/>
+          </a:xfrm>
+          <a:prstGeom prst="rect">
+            <a:avLst/>
+          </a:prstGeom>
+        </p:spPr>
+        <p:txBody>
+          <a:bodyPr vert="horz" lIns="91440" tIns="45720" rIns="91440" bIns="45720" rtlCol="0" anchor="ctr">
+            <a:normAutofit/>
+          </a:bodyPr>
+          <a:lstStyle>
+            <a:lvl1pPr algn="l" defTabSz="914400" rtl="0" eaLnBrk="1" latinLnBrk="0" hangingPunct="1">
+              <a:lnSpc>
+                <a:spcPct val="90000"/>
+              </a:lnSpc>
+              <a:spcBef>
+                <a:spcPct val="0"/>
+              </a:spcBef>
+              <a:buNone/>
+              <a:defRPr sz="4400" kern="1200">
+                <a:solidFill>
+                  <a:schemeClr val="tx1"/>
+                </a:solidFill>
+                <a:latin typeface="+mj-lt"/>
+                <a:ea typeface="+mj-ea"/>
+                <a:cs typeface="+mj-cs"/>
+              </a:defRPr>
+            </a:lvl1pPr>
+          </a:lstStyle>
+          <a:p>
+            <a:r>
+              <a:rPr lang="en-US" b="1" u="sng" dirty="0"/>
+              <a:t>Breaking Down Data Flow: (Overall)</a:t>
+            </a:r>
+          </a:p>
+        </p:txBody>
+      </p:sp>
+    </p:spTree>
+    <p:extLst>
+      <p:ext uri="{BB962C8B-B14F-4D97-AF65-F5344CB8AC3E}">
+        <p14:creationId xmlns:p14="http://schemas.microsoft.com/office/powerpoint/2010/main" val="720888633"/>
+      </p:ext>
+    </p:extLst>
+  </p:cSld>
+  <p:clrMapOvr>
+    <a:masterClrMapping/>
+  </p:clrMapOvr>
+</p:sld>
+</file>
+
+<file path=ppt/slides/slide7.xml><?xml version="1.0" encoding="utf-8"?>
+<p:sld xmlns:a="http://schemas.openxmlformats.org/drawingml/2006/main" xmlns:r="http://schemas.openxmlformats.org/officeDocument/2006/relationships" xmlns:p="http://schemas.openxmlformats.org/presentationml/2006/main">
+  <p:cSld>
+    <p:spTree>
+      <p:nvGrpSpPr>
+        <p:cNvPr id="1" name=""/>
+        <p:cNvGrpSpPr/>
+        <p:nvPr/>
+      </p:nvGrpSpPr>
+      <p:grpSpPr>
+        <a:xfrm>
+          <a:off x="0" y="0"/>
+          <a:ext cx="0" cy="0"/>
+          <a:chOff x="0" y="0"/>
+          <a:chExt cx="0" cy="0"/>
+        </a:xfrm>
+      </p:grpSpPr>
+      <p:sp>
+        <p:nvSpPr>
           <p:cNvPr id="2" name="Title 1">
             <a:extLst>
               <a:ext uri="{FF2B5EF4-FFF2-40B4-BE49-F238E27FC236}">
@@ -7950,8 +9114,8 @@
         </p:nvSpPr>
         <p:spPr>
           <a:xfrm flipH="1">
-            <a:off x="2525486" y="1822703"/>
-            <a:ext cx="8163366" cy="3242783"/>
+            <a:off x="2629507" y="1455703"/>
+            <a:ext cx="8163366" cy="4604629"/>
           </a:xfrm>
           <a:prstGeom prst="flowChartOnlineStorage">
             <a:avLst/>
@@ -7959,6 +9123,11 @@
           <a:solidFill>
             <a:srgbClr val="B685DB"/>
           </a:solidFill>
+          <a:ln>
+            <a:solidFill>
+              <a:srgbClr val="B685DB"/>
+            </a:solidFill>
+          </a:ln>
         </p:spPr>
         <p:style>
           <a:lnRef idx="2">
@@ -8129,7 +9298,81 @@
             </a:endParaRPr>
           </a:p>
           <a:p>
-            <a:pPr algn="ctr"/>
+            <a:endParaRPr lang="en-US" dirty="0">
+              <a:ln w="0"/>
+              <a:solidFill>
+                <a:schemeClr val="tx1"/>
+              </a:solidFill>
+              <a:effectLst>
+                <a:outerShdw blurRad="38100" dist="19050" dir="2700000" algn="tl" rotWithShape="0">
+                  <a:schemeClr val="dk1">
+                    <a:alpha val="40000"/>
+                  </a:schemeClr>
+                </a:outerShdw>
+              </a:effectLst>
+            </a:endParaRPr>
+          </a:p>
+          <a:p>
+            <a:endParaRPr lang="en-US" dirty="0">
+              <a:ln w="0"/>
+              <a:solidFill>
+                <a:schemeClr val="tx1"/>
+              </a:solidFill>
+              <a:effectLst>
+                <a:outerShdw blurRad="38100" dist="19050" dir="2700000" algn="tl" rotWithShape="0">
+                  <a:schemeClr val="dk1">
+                    <a:alpha val="40000"/>
+                  </a:schemeClr>
+                </a:outerShdw>
+              </a:effectLst>
+            </a:endParaRPr>
+          </a:p>
+          <a:p>
+            <a:endParaRPr lang="en-US" dirty="0">
+              <a:ln w="0"/>
+              <a:solidFill>
+                <a:schemeClr val="tx1"/>
+              </a:solidFill>
+              <a:effectLst>
+                <a:outerShdw blurRad="38100" dist="19050" dir="2700000" algn="tl" rotWithShape="0">
+                  <a:schemeClr val="dk1">
+                    <a:alpha val="40000"/>
+                  </a:schemeClr>
+                </a:outerShdw>
+              </a:effectLst>
+            </a:endParaRPr>
+          </a:p>
+          <a:p>
+            <a:endParaRPr lang="en-US" dirty="0">
+              <a:ln w="0"/>
+              <a:solidFill>
+                <a:schemeClr val="tx1"/>
+              </a:solidFill>
+              <a:effectLst>
+                <a:outerShdw blurRad="38100" dist="19050" dir="2700000" algn="tl" rotWithShape="0">
+                  <a:schemeClr val="dk1">
+                    <a:alpha val="40000"/>
+                  </a:schemeClr>
+                </a:outerShdw>
+              </a:effectLst>
+            </a:endParaRPr>
+          </a:p>
+          <a:p>
+            <a:endParaRPr lang="en-US" dirty="0">
+              <a:ln w="0"/>
+              <a:solidFill>
+                <a:schemeClr val="tx1"/>
+              </a:solidFill>
+              <a:effectLst>
+                <a:outerShdw blurRad="38100" dist="19050" dir="2700000" algn="tl" rotWithShape="0">
+                  <a:schemeClr val="dk1">
+                    <a:alpha val="40000"/>
+                  </a:schemeClr>
+                </a:outerShdw>
+              </a:effectLst>
+            </a:endParaRPr>
+          </a:p>
+          <a:p>
             <a:r>
               <a:rPr lang="en-US" dirty="0">
                 <a:ln w="0"/>
@@ -8148,7 +9391,6 @@
             </a:r>
           </a:p>
           <a:p>
-            <a:pPr algn="ctr"/>
             <a:r>
               <a:rPr lang="en-US" dirty="0">
                 <a:ln w="0"/>
@@ -8182,8 +9424,8 @@
         </p:nvSpPr>
         <p:spPr>
           <a:xfrm>
-            <a:off x="6571843" y="856370"/>
-            <a:ext cx="1015725" cy="432543"/>
+            <a:off x="5529233" y="856370"/>
+            <a:ext cx="2058335" cy="432543"/>
           </a:xfrm>
           <a:prstGeom prst="flowChartDocument">
             <a:avLst/>
@@ -8211,15 +9453,8 @@
           <a:p>
             <a:pPr algn="ctr"/>
             <a:r>
-              <a:rPr lang="en-US" sz="1100" dirty="0"/>
-              <a:t>Model</a:t>
-            </a:r>
-          </a:p>
-          <a:p>
-            <a:pPr algn="ctr"/>
-            <a:r>
-              <a:rPr lang="en-US" sz="1100" dirty="0"/>
-              <a:t>Configuration</a:t>
+              <a:rPr lang="en-US" sz="1600" dirty="0"/>
+              <a:t>Tuner Configuration</a:t>
             </a:r>
           </a:p>
         </p:txBody>
@@ -8238,8 +9473,8 @@
         </p:nvSpPr>
         <p:spPr>
           <a:xfrm>
-            <a:off x="8599251" y="856371"/>
-            <a:ext cx="1015725" cy="432543"/>
+            <a:off x="7726378" y="849005"/>
+            <a:ext cx="2058335" cy="432543"/>
           </a:xfrm>
           <a:prstGeom prst="flowChartDocument">
             <a:avLst/>
@@ -8267,15 +9502,8 @@
           <a:p>
             <a:pPr algn="ctr"/>
             <a:r>
-              <a:rPr lang="en-US" sz="1100" dirty="0"/>
-              <a:t>Tuner</a:t>
-            </a:r>
-          </a:p>
-          <a:p>
-            <a:pPr algn="ctr"/>
-            <a:r>
-              <a:rPr lang="en-US" sz="1100" dirty="0"/>
-              <a:t>Configuration</a:t>
+              <a:rPr lang="en-US" sz="1600" dirty="0"/>
+              <a:t>Model Configuration</a:t>
             </a:r>
           </a:p>
         </p:txBody>
@@ -8294,7 +9522,7 @@
         </p:nvSpPr>
         <p:spPr>
           <a:xfrm>
-            <a:off x="158675" y="1695086"/>
+            <a:off x="120784" y="1159020"/>
             <a:ext cx="885217" cy="904674"/>
           </a:xfrm>
           <a:prstGeom prst="flowChartMultidocument">
@@ -8338,10 +9566,10 @@
       </p:sp>
       <p:sp>
         <p:nvSpPr>
-          <p:cNvPr id="9" name="Arrow: Right 8">
-            <a:extLst>
-              <a:ext uri="{FF2B5EF4-FFF2-40B4-BE49-F238E27FC236}">
-                <a16:creationId xmlns:a16="http://schemas.microsoft.com/office/drawing/2014/main" id="{A20F0100-CA31-4321-91A3-9B5011A5AC2D}"/>
+          <p:cNvPr id="11" name="Flowchart: Data 10">
+            <a:extLst>
+              <a:ext uri="{FF2B5EF4-FFF2-40B4-BE49-F238E27FC236}">
+                <a16:creationId xmlns:a16="http://schemas.microsoft.com/office/drawing/2014/main" id="{7EC87890-3F53-4C56-99A8-788FA5AFF176}"/>
               </a:ext>
             </a:extLst>
           </p:cNvPr>
@@ -8350,56 +9578,7 @@
         </p:nvSpPr>
         <p:spPr>
           <a:xfrm>
-            <a:off x="2680598" y="2907196"/>
-            <a:ext cx="837780" cy="1193050"/>
-          </a:xfrm>
-          <a:prstGeom prst="rightArrow">
-            <a:avLst/>
-          </a:prstGeom>
-        </p:spPr>
-        <p:style>
-          <a:lnRef idx="2">
-            <a:schemeClr val="accent1">
-              <a:shade val="50000"/>
-            </a:schemeClr>
-          </a:lnRef>
-          <a:fillRef idx="1">
-            <a:schemeClr val="accent1"/>
-          </a:fillRef>
-          <a:effectRef idx="0">
-            <a:schemeClr val="accent1"/>
-          </a:effectRef>
-          <a:fontRef idx="minor">
-            <a:schemeClr val="lt1"/>
-          </a:fontRef>
-        </p:style>
-        <p:txBody>
-          <a:bodyPr rtlCol="0" anchor="ctr"/>
-          <a:lstStyle/>
-          <a:p>
-            <a:pPr algn="ctr"/>
-            <a:r>
-              <a:rPr lang="en-US" sz="1100" dirty="0"/>
-              <a:t>Image List-of-Tuples</a:t>
-            </a:r>
-          </a:p>
-        </p:txBody>
-      </p:sp>
-      <p:sp>
-        <p:nvSpPr>
-          <p:cNvPr id="11" name="Flowchart: Data 10">
-            <a:extLst>
-              <a:ext uri="{FF2B5EF4-FFF2-40B4-BE49-F238E27FC236}">
-                <a16:creationId xmlns:a16="http://schemas.microsoft.com/office/drawing/2014/main" id="{7EC87890-3F53-4C56-99A8-788FA5AFF176}"/>
-              </a:ext>
-            </a:extLst>
-          </p:cNvPr>
-          <p:cNvSpPr/>
-          <p:nvPr/>
-        </p:nvSpPr>
-        <p:spPr>
-          <a:xfrm>
-            <a:off x="1684712" y="5163818"/>
+            <a:off x="2805736" y="5989586"/>
             <a:ext cx="2136431" cy="797668"/>
           </a:xfrm>
           <a:prstGeom prst="flowChartInputOutput">
@@ -8459,8 +9638,8 @@
         </p:nvCxnSpPr>
         <p:spPr>
           <a:xfrm rot="10800000" flipV="1">
-            <a:off x="1716341" y="1088030"/>
-            <a:ext cx="1537633" cy="1943900"/>
+            <a:off x="1297317" y="1088029"/>
+            <a:ext cx="1956657" cy="923991"/>
           </a:xfrm>
           <a:prstGeom prst="bentConnector2">
             <a:avLst/>
@@ -8500,14 +9679,14 @@
           <p:cNvCxnSpPr>
             <a:cxnSpLocks/>
             <a:stCxn id="6" idx="2"/>
-            <a:endCxn id="5" idx="0"/>
+            <a:endCxn id="98" idx="0"/>
           </p:cNvCxnSpPr>
           <p:nvPr/>
         </p:nvCxnSpPr>
         <p:spPr>
           <a:xfrm rot="5400000">
-            <a:off x="6562245" y="1305242"/>
-            <a:ext cx="562386" cy="472537"/>
+            <a:off x="5366051" y="770047"/>
+            <a:ext cx="702081" cy="1682621"/>
           </a:xfrm>
           <a:prstGeom prst="bentConnector3">
             <a:avLst>
@@ -8549,19 +9728,17 @@
           <p:cNvCxnSpPr>
             <a:cxnSpLocks/>
             <a:stCxn id="7" idx="2"/>
-            <a:endCxn id="5" idx="0"/>
+            <a:endCxn id="102" idx="3"/>
           </p:cNvCxnSpPr>
           <p:nvPr/>
         </p:nvCxnSpPr>
         <p:spPr>
           <a:xfrm rot="5400000">
-            <a:off x="7575950" y="291538"/>
-            <a:ext cx="562385" cy="2499945"/>
-          </a:xfrm>
-          <a:prstGeom prst="bentConnector3">
-            <a:avLst>
-              <a:gd name="adj1" fmla="val 50000"/>
-            </a:avLst>
+            <a:off x="7379023" y="1001857"/>
+            <a:ext cx="1125428" cy="1627618"/>
+          </a:xfrm>
+          <a:prstGeom prst="bentConnector2">
+            <a:avLst/>
           </a:prstGeom>
           <a:ln w="76200">
             <a:solidFill>
@@ -8597,19 +9774,19 @@
           </p:cNvPr>
           <p:cNvCxnSpPr>
             <a:cxnSpLocks/>
-            <a:stCxn id="5" idx="1"/>
+            <a:stCxn id="115" idx="3"/>
             <a:endCxn id="11" idx="5"/>
           </p:cNvCxnSpPr>
           <p:nvPr/>
         </p:nvCxnSpPr>
         <p:spPr>
           <a:xfrm flipH="1">
-            <a:off x="3607500" y="3444095"/>
-            <a:ext cx="7081352" cy="2118557"/>
+            <a:off x="4728524" y="3314959"/>
+            <a:ext cx="5370782" cy="3073461"/>
           </a:xfrm>
           <a:prstGeom prst="bentConnector3">
             <a:avLst>
-              <a:gd name="adj1" fmla="val -3228"/>
+              <a:gd name="adj1" fmla="val -18917"/>
             </a:avLst>
           </a:prstGeom>
           <a:ln w="76200">
@@ -8653,14 +9830,11 @@
         </p:nvCxnSpPr>
         <p:spPr>
           <a:xfrm rot="10800000">
-            <a:off x="1716341" y="3975512"/>
-            <a:ext cx="182015" cy="1587140"/>
-          </a:xfrm>
-          <a:prstGeom prst="bentConnector4">
-            <a:avLst>
-              <a:gd name="adj1" fmla="val 125594"/>
-              <a:gd name="adj2" fmla="val 62565"/>
-            </a:avLst>
+            <a:off x="1297317" y="2955604"/>
+            <a:ext cx="1722063" cy="3432817"/>
+          </a:xfrm>
+          <a:prstGeom prst="bentConnector2">
+            <a:avLst/>
           </a:prstGeom>
           <a:ln w="76200">
             <a:solidFill>
@@ -8699,7 +9873,7 @@
         </p:nvSpPr>
         <p:spPr>
           <a:xfrm>
-            <a:off x="10064872" y="5695208"/>
+            <a:off x="10249056" y="5989586"/>
             <a:ext cx="1692613" cy="797668"/>
           </a:xfrm>
           <a:prstGeom prst="flowChartDocument">
@@ -8751,7 +9925,7 @@
         </p:nvCxnSpPr>
         <p:spPr>
           <a:xfrm>
-            <a:off x="10911179" y="5250896"/>
+            <a:off x="11095363" y="5545274"/>
             <a:ext cx="0" cy="444312"/>
           </a:xfrm>
           <a:prstGeom prst="straightConnector1">
@@ -8779,71 +9953,6 @@
           </a:fontRef>
         </p:style>
       </p:cxnSp>
-      <p:pic>
-        <p:nvPicPr>
-          <p:cNvPr id="151" name="Picture 150">
-            <a:extLst>
-              <a:ext uri="{FF2B5EF4-FFF2-40B4-BE49-F238E27FC236}">
-                <a16:creationId xmlns:a16="http://schemas.microsoft.com/office/drawing/2014/main" id="{33C18546-9593-4019-87AC-0ED36C330E61}"/>
-              </a:ext>
-            </a:extLst>
-          </p:cNvPr>
-          <p:cNvPicPr>
-            <a:picLocks noChangeAspect="1"/>
-          </p:cNvPicPr>
-          <p:nvPr/>
-        </p:nvPicPr>
-        <p:blipFill>
-          <a:blip r:embed="rId2"/>
-          <a:stretch>
-            <a:fillRect/>
-          </a:stretch>
-        </p:blipFill>
-        <p:spPr>
-          <a:xfrm>
-            <a:off x="65675" y="6139566"/>
-            <a:ext cx="737680" cy="640135"/>
-          </a:xfrm>
-          <a:prstGeom prst="rect">
-            <a:avLst/>
-          </a:prstGeom>
-        </p:spPr>
-      </p:pic>
-      <p:sp>
-        <p:nvSpPr>
-          <p:cNvPr id="152" name="TextBox 151">
-            <a:extLst>
-              <a:ext uri="{FF2B5EF4-FFF2-40B4-BE49-F238E27FC236}">
-                <a16:creationId xmlns:a16="http://schemas.microsoft.com/office/drawing/2014/main" id="{5EAF6769-67C2-42B2-90F9-EA49471FFD37}"/>
-              </a:ext>
-            </a:extLst>
-          </p:cNvPr>
-          <p:cNvSpPr txBox="1"/>
-          <p:nvPr/>
-        </p:nvSpPr>
-        <p:spPr>
-          <a:xfrm>
-            <a:off x="757070" y="6130046"/>
-            <a:ext cx="1995858" cy="646331"/>
-          </a:xfrm>
-          <a:prstGeom prst="rect">
-            <a:avLst/>
-          </a:prstGeom>
-          <a:noFill/>
-        </p:spPr>
-        <p:txBody>
-          <a:bodyPr wrap="square" rtlCol="0">
-            <a:spAutoFit/>
-          </a:bodyPr>
-          <a:lstStyle/>
-          <a:p>
-            <a:r>
-              <a:rPr lang="en-US" dirty="0"/>
-              <a:t>Loop/apply Function to all files</a:t>
-            </a:r>
-          </a:p>
-        </p:txBody>
-      </p:sp>
       <p:cxnSp>
         <p:nvCxnSpPr>
           <p:cNvPr id="39" name="Connector: Elbow 38">
@@ -8855,14 +9964,15 @@
           </p:cNvPr>
           <p:cNvCxnSpPr>
             <a:cxnSpLocks/>
+            <a:stCxn id="8" idx="2"/>
             <a:endCxn id="42" idx="1"/>
           </p:cNvCxnSpPr>
           <p:nvPr/>
         </p:nvCxnSpPr>
         <p:spPr>
           <a:xfrm rot="16200000" flipH="1">
-            <a:off x="441590" y="2698175"/>
-            <a:ext cx="908416" cy="702675"/>
+            <a:off x="442829" y="2088441"/>
+            <a:ext cx="454378" cy="336363"/>
           </a:xfrm>
           <a:prstGeom prst="bentConnector2">
             <a:avLst/>
@@ -8904,8 +10014,8 @@
         </p:nvSpPr>
         <p:spPr>
           <a:xfrm>
-            <a:off x="1247136" y="3031930"/>
-            <a:ext cx="1410198" cy="943582"/>
+            <a:off x="838200" y="2012021"/>
+            <a:ext cx="1390022" cy="943582"/>
           </a:xfrm>
           <a:prstGeom prst="homePlate">
             <a:avLst/>
@@ -8976,6 +10086,1684 @@
           </a:p>
         </p:txBody>
       </p:sp>
+      <p:sp>
+        <p:nvSpPr>
+          <p:cNvPr id="66" name="Flowchart: Multidocument 65">
+            <a:extLst>
+              <a:ext uri="{FF2B5EF4-FFF2-40B4-BE49-F238E27FC236}">
+                <a16:creationId xmlns:a16="http://schemas.microsoft.com/office/drawing/2014/main" id="{99C3B620-AEDD-41A2-98EF-76A0FB7BCF95}"/>
+              </a:ext>
+            </a:extLst>
+          </p:cNvPr>
+          <p:cNvSpPr/>
+          <p:nvPr/>
+        </p:nvSpPr>
+        <p:spPr>
+          <a:xfrm>
+            <a:off x="1807647" y="4736819"/>
+            <a:ext cx="1145285" cy="904674"/>
+          </a:xfrm>
+          <a:prstGeom prst="flowChartMultidocument">
+            <a:avLst/>
+          </a:prstGeom>
+          <a:solidFill>
+            <a:srgbClr val="FFE699"/>
+          </a:solidFill>
+        </p:spPr>
+        <p:style>
+          <a:lnRef idx="2">
+            <a:schemeClr val="accent1">
+              <a:shade val="50000"/>
+            </a:schemeClr>
+          </a:lnRef>
+          <a:fillRef idx="1">
+            <a:schemeClr val="accent1"/>
+          </a:fillRef>
+          <a:effectRef idx="0">
+            <a:schemeClr val="accent1"/>
+          </a:effectRef>
+          <a:fontRef idx="minor">
+            <a:schemeClr val="lt1"/>
+          </a:fontRef>
+        </p:style>
+        <p:txBody>
+          <a:bodyPr rot="0" spcFirstLastPara="0" vertOverflow="overflow" horzOverflow="overflow" vert="horz" wrap="square" lIns="91440" tIns="45720" rIns="91440" bIns="45720" numCol="1" spcCol="0" rtlCol="0" fromWordArt="0" anchor="ctr" anchorCtr="0" forceAA="0" compatLnSpc="1">
+            <a:prstTxWarp prst="textNoShape">
+              <a:avLst/>
+            </a:prstTxWarp>
+            <a:noAutofit/>
+          </a:bodyPr>
+          <a:lstStyle/>
+          <a:p>
+            <a:pPr algn="ctr"/>
+            <a:r>
+              <a:rPr lang="en-US" sz="1100" dirty="0">
+                <a:ln w="0"/>
+                <a:solidFill>
+                  <a:schemeClr val="tx1"/>
+                </a:solidFill>
+                <a:effectLst>
+                  <a:outerShdw blurRad="38100" dist="19050" dir="2700000" algn="tl" rotWithShape="0">
+                    <a:schemeClr val="dk1">
+                      <a:alpha val="40000"/>
+                    </a:schemeClr>
+                  </a:outerShdw>
+                </a:effectLst>
+              </a:rPr>
+              <a:t>Transformed PNG Images</a:t>
+            </a:r>
+          </a:p>
+        </p:txBody>
+      </p:sp>
+      <p:sp>
+        <p:nvSpPr>
+          <p:cNvPr id="52" name="Arrow: Pentagon 51">
+            <a:extLst>
+              <a:ext uri="{FF2B5EF4-FFF2-40B4-BE49-F238E27FC236}">
+                <a16:creationId xmlns:a16="http://schemas.microsoft.com/office/drawing/2014/main" id="{EE4AEBBF-9F3E-494E-8994-E0565D79CC9B}"/>
+              </a:ext>
+            </a:extLst>
+          </p:cNvPr>
+          <p:cNvSpPr/>
+          <p:nvPr/>
+        </p:nvSpPr>
+        <p:spPr>
+          <a:xfrm>
+            <a:off x="2061560" y="2929653"/>
+            <a:ext cx="1047413" cy="1090300"/>
+          </a:xfrm>
+          <a:prstGeom prst="homePlate">
+            <a:avLst>
+              <a:gd name="adj" fmla="val 23376"/>
+            </a:avLst>
+          </a:prstGeom>
+        </p:spPr>
+        <p:style>
+          <a:lnRef idx="2">
+            <a:schemeClr val="accent1">
+              <a:shade val="50000"/>
+            </a:schemeClr>
+          </a:lnRef>
+          <a:fillRef idx="1">
+            <a:schemeClr val="accent1"/>
+          </a:fillRef>
+          <a:effectRef idx="0">
+            <a:schemeClr val="accent1"/>
+          </a:effectRef>
+          <a:fontRef idx="minor">
+            <a:schemeClr val="lt1"/>
+          </a:fontRef>
+        </p:style>
+        <p:txBody>
+          <a:bodyPr rtlCol="0" anchor="ctr"/>
+          <a:lstStyle/>
+          <a:p>
+            <a:pPr algn="ctr"/>
+            <a:r>
+              <a:rPr lang="en-US" sz="1400" dirty="0"/>
+              <a:t>“IF” Config:</a:t>
+            </a:r>
+          </a:p>
+          <a:p>
+            <a:pPr algn="ctr"/>
+            <a:r>
+              <a:rPr lang="en-US" sz="1400" dirty="0"/>
+              <a:t>Data from Files or List</a:t>
+            </a:r>
+          </a:p>
+        </p:txBody>
+      </p:sp>
+      <p:sp>
+        <p:nvSpPr>
+          <p:cNvPr id="98" name="Flowchart: Decision 97">
+            <a:extLst>
+              <a:ext uri="{FF2B5EF4-FFF2-40B4-BE49-F238E27FC236}">
+                <a16:creationId xmlns:a16="http://schemas.microsoft.com/office/drawing/2014/main" id="{700EDCFE-11F2-4C66-8413-8E55C4B31F34}"/>
+              </a:ext>
+            </a:extLst>
+          </p:cNvPr>
+          <p:cNvSpPr/>
+          <p:nvPr/>
+        </p:nvSpPr>
+        <p:spPr>
+          <a:xfrm>
+            <a:off x="4319000" y="1962398"/>
+            <a:ext cx="1113560" cy="851117"/>
+          </a:xfrm>
+          <a:prstGeom prst="flowChartDecision">
+            <a:avLst/>
+          </a:prstGeom>
+        </p:spPr>
+        <p:style>
+          <a:lnRef idx="2">
+            <a:schemeClr val="accent1">
+              <a:shade val="50000"/>
+            </a:schemeClr>
+          </a:lnRef>
+          <a:fillRef idx="1">
+            <a:schemeClr val="accent1"/>
+          </a:fillRef>
+          <a:effectRef idx="0">
+            <a:schemeClr val="accent1"/>
+          </a:effectRef>
+          <a:fontRef idx="minor">
+            <a:schemeClr val="lt1"/>
+          </a:fontRef>
+        </p:style>
+        <p:txBody>
+          <a:bodyPr wrap="none" rtlCol="0" anchor="ctr"/>
+          <a:lstStyle/>
+          <a:p>
+            <a:pPr algn="ctr"/>
+            <a:r>
+              <a:rPr lang="en-US" dirty="0"/>
+              <a:t>FOR:</a:t>
+            </a:r>
+          </a:p>
+          <a:p>
+            <a:pPr algn="ctr"/>
+            <a:r>
+              <a:rPr lang="en-US" dirty="0"/>
+              <a:t>Tuners</a:t>
+            </a:r>
+          </a:p>
+        </p:txBody>
+      </p:sp>
+      <p:sp>
+        <p:nvSpPr>
+          <p:cNvPr id="102" name="Flowchart: Predefined Process 101">
+            <a:extLst>
+              <a:ext uri="{FF2B5EF4-FFF2-40B4-BE49-F238E27FC236}">
+                <a16:creationId xmlns:a16="http://schemas.microsoft.com/office/drawing/2014/main" id="{69B112AF-ED2D-4F86-8751-DE9401885A4F}"/>
+              </a:ext>
+            </a:extLst>
+          </p:cNvPr>
+          <p:cNvSpPr/>
+          <p:nvPr/>
+        </p:nvSpPr>
+        <p:spPr>
+          <a:xfrm>
+            <a:off x="5952119" y="2119805"/>
+            <a:ext cx="1175809" cy="517150"/>
+          </a:xfrm>
+          <a:prstGeom prst="flowChartPredefinedProcess">
+            <a:avLst/>
+          </a:prstGeom>
+        </p:spPr>
+        <p:style>
+          <a:lnRef idx="2">
+            <a:schemeClr val="accent1">
+              <a:shade val="50000"/>
+            </a:schemeClr>
+          </a:lnRef>
+          <a:fillRef idx="1">
+            <a:schemeClr val="accent1"/>
+          </a:fillRef>
+          <a:effectRef idx="0">
+            <a:schemeClr val="accent1"/>
+          </a:effectRef>
+          <a:fontRef idx="minor">
+            <a:schemeClr val="lt1"/>
+          </a:fontRef>
+        </p:style>
+        <p:txBody>
+          <a:bodyPr rtlCol="0" anchor="ctr"/>
+          <a:lstStyle/>
+          <a:p>
+            <a:pPr algn="ctr"/>
+            <a:r>
+              <a:rPr lang="en-US" sz="1600" dirty="0"/>
+              <a:t>Setup Model</a:t>
+            </a:r>
+          </a:p>
+        </p:txBody>
+      </p:sp>
+      <p:cxnSp>
+        <p:nvCxnSpPr>
+          <p:cNvPr id="103" name="Connector: Elbow 102">
+            <a:extLst>
+              <a:ext uri="{FF2B5EF4-FFF2-40B4-BE49-F238E27FC236}">
+                <a16:creationId xmlns:a16="http://schemas.microsoft.com/office/drawing/2014/main" id="{30FE1D69-9FAF-407A-A12B-55F9168F6B5C}"/>
+              </a:ext>
+            </a:extLst>
+          </p:cNvPr>
+          <p:cNvCxnSpPr>
+            <a:cxnSpLocks/>
+            <a:stCxn id="98" idx="3"/>
+            <a:endCxn id="102" idx="1"/>
+          </p:cNvCxnSpPr>
+          <p:nvPr/>
+        </p:nvCxnSpPr>
+        <p:spPr>
+          <a:xfrm flipV="1">
+            <a:off x="5432560" y="2378380"/>
+            <a:ext cx="519559" cy="9577"/>
+          </a:xfrm>
+          <a:prstGeom prst="bentConnector3">
+            <a:avLst>
+              <a:gd name="adj1" fmla="val 50000"/>
+            </a:avLst>
+          </a:prstGeom>
+          <a:ln w="53975">
+            <a:solidFill>
+              <a:srgbClr val="FFE699"/>
+            </a:solidFill>
+            <a:prstDash val="solid"/>
+            <a:tailEnd type="triangle"/>
+          </a:ln>
+        </p:spPr>
+        <p:style>
+          <a:lnRef idx="1">
+            <a:schemeClr val="accent1"/>
+          </a:lnRef>
+          <a:fillRef idx="0">
+            <a:schemeClr val="accent1"/>
+          </a:fillRef>
+          <a:effectRef idx="0">
+            <a:schemeClr val="accent1"/>
+          </a:effectRef>
+          <a:fontRef idx="minor">
+            <a:schemeClr val="tx1"/>
+          </a:fontRef>
+        </p:style>
+      </p:cxnSp>
+      <p:sp>
+        <p:nvSpPr>
+          <p:cNvPr id="110" name="Flowchart: Decision 109">
+            <a:extLst>
+              <a:ext uri="{FF2B5EF4-FFF2-40B4-BE49-F238E27FC236}">
+                <a16:creationId xmlns:a16="http://schemas.microsoft.com/office/drawing/2014/main" id="{E37214F8-AD76-4850-9946-E6E91255CADC}"/>
+              </a:ext>
+            </a:extLst>
+          </p:cNvPr>
+          <p:cNvSpPr/>
+          <p:nvPr/>
+        </p:nvSpPr>
+        <p:spPr>
+          <a:xfrm>
+            <a:off x="5983243" y="2876399"/>
+            <a:ext cx="1113560" cy="851117"/>
+          </a:xfrm>
+          <a:prstGeom prst="flowChartDecision">
+            <a:avLst/>
+          </a:prstGeom>
+        </p:spPr>
+        <p:style>
+          <a:lnRef idx="2">
+            <a:schemeClr val="accent1">
+              <a:shade val="50000"/>
+            </a:schemeClr>
+          </a:lnRef>
+          <a:fillRef idx="1">
+            <a:schemeClr val="accent1"/>
+          </a:fillRef>
+          <a:effectRef idx="0">
+            <a:schemeClr val="accent1"/>
+          </a:effectRef>
+          <a:fontRef idx="minor">
+            <a:schemeClr val="lt1"/>
+          </a:fontRef>
+        </p:style>
+        <p:txBody>
+          <a:bodyPr wrap="none" rtlCol="0" anchor="ctr"/>
+          <a:lstStyle/>
+          <a:p>
+            <a:pPr algn="ctr"/>
+            <a:r>
+              <a:rPr lang="en-US" dirty="0"/>
+              <a:t>FOR:</a:t>
+            </a:r>
+          </a:p>
+          <a:p>
+            <a:pPr algn="ctr"/>
+            <a:r>
+              <a:rPr lang="en-US" dirty="0"/>
+              <a:t>Epochs</a:t>
+            </a:r>
+          </a:p>
+        </p:txBody>
+      </p:sp>
+      <p:cxnSp>
+        <p:nvCxnSpPr>
+          <p:cNvPr id="111" name="Connector: Elbow 110">
+            <a:extLst>
+              <a:ext uri="{FF2B5EF4-FFF2-40B4-BE49-F238E27FC236}">
+                <a16:creationId xmlns:a16="http://schemas.microsoft.com/office/drawing/2014/main" id="{5C74C3D8-FA39-42AE-AD73-37897C8B1727}"/>
+              </a:ext>
+            </a:extLst>
+          </p:cNvPr>
+          <p:cNvCxnSpPr>
+            <a:cxnSpLocks/>
+            <a:stCxn id="102" idx="2"/>
+            <a:endCxn id="110" idx="0"/>
+          </p:cNvCxnSpPr>
+          <p:nvPr/>
+        </p:nvCxnSpPr>
+        <p:spPr>
+          <a:xfrm rot="5400000">
+            <a:off x="6420302" y="2756677"/>
+            <a:ext cx="239444" cy="1"/>
+          </a:xfrm>
+          <a:prstGeom prst="bentConnector3">
+            <a:avLst>
+              <a:gd name="adj1" fmla="val 50000"/>
+            </a:avLst>
+          </a:prstGeom>
+          <a:ln w="53975">
+            <a:solidFill>
+              <a:srgbClr val="FFE699"/>
+            </a:solidFill>
+            <a:prstDash val="sysDot"/>
+            <a:tailEnd type="triangle"/>
+          </a:ln>
+        </p:spPr>
+        <p:style>
+          <a:lnRef idx="1">
+            <a:schemeClr val="accent1"/>
+          </a:lnRef>
+          <a:fillRef idx="0">
+            <a:schemeClr val="accent1"/>
+          </a:fillRef>
+          <a:effectRef idx="0">
+            <a:schemeClr val="accent1"/>
+          </a:effectRef>
+          <a:fontRef idx="minor">
+            <a:schemeClr val="tx1"/>
+          </a:fontRef>
+        </p:style>
+      </p:cxnSp>
+      <p:sp>
+        <p:nvSpPr>
+          <p:cNvPr id="115" name="Flowchart: Predefined Process 114">
+            <a:extLst>
+              <a:ext uri="{FF2B5EF4-FFF2-40B4-BE49-F238E27FC236}">
+                <a16:creationId xmlns:a16="http://schemas.microsoft.com/office/drawing/2014/main" id="{A6EF3150-0E79-4567-8A4D-5885636F5C9E}"/>
+              </a:ext>
+            </a:extLst>
+          </p:cNvPr>
+          <p:cNvSpPr/>
+          <p:nvPr/>
+        </p:nvSpPr>
+        <p:spPr>
+          <a:xfrm>
+            <a:off x="8923497" y="3056384"/>
+            <a:ext cx="1175809" cy="517150"/>
+          </a:xfrm>
+          <a:prstGeom prst="flowChartPredefinedProcess">
+            <a:avLst/>
+          </a:prstGeom>
+        </p:spPr>
+        <p:style>
+          <a:lnRef idx="2">
+            <a:schemeClr val="accent1">
+              <a:shade val="50000"/>
+            </a:schemeClr>
+          </a:lnRef>
+          <a:fillRef idx="1">
+            <a:schemeClr val="accent1"/>
+          </a:fillRef>
+          <a:effectRef idx="0">
+            <a:schemeClr val="accent1"/>
+          </a:effectRef>
+          <a:fontRef idx="minor">
+            <a:schemeClr val="lt1"/>
+          </a:fontRef>
+        </p:style>
+        <p:txBody>
+          <a:bodyPr rtlCol="0" anchor="ctr"/>
+          <a:lstStyle/>
+          <a:p>
+            <a:pPr algn="ctr"/>
+            <a:r>
+              <a:rPr lang="en-US" sz="1600" dirty="0"/>
+              <a:t>Log</a:t>
+            </a:r>
+          </a:p>
+          <a:p>
+            <a:pPr algn="ctr"/>
+            <a:r>
+              <a:rPr lang="en-US" sz="1600" dirty="0"/>
+              <a:t>Report</a:t>
+            </a:r>
+          </a:p>
+        </p:txBody>
+      </p:sp>
+      <p:sp>
+        <p:nvSpPr>
+          <p:cNvPr id="116" name="Flowchart: Predefined Process 115">
+            <a:extLst>
+              <a:ext uri="{FF2B5EF4-FFF2-40B4-BE49-F238E27FC236}">
+                <a16:creationId xmlns:a16="http://schemas.microsoft.com/office/drawing/2014/main" id="{6F7BBA31-8BF8-46F6-9DA2-061EF6F91870}"/>
+              </a:ext>
+            </a:extLst>
+          </p:cNvPr>
+          <p:cNvSpPr/>
+          <p:nvPr/>
+        </p:nvSpPr>
+        <p:spPr>
+          <a:xfrm>
+            <a:off x="7316015" y="3055479"/>
+            <a:ext cx="1175809" cy="517150"/>
+          </a:xfrm>
+          <a:prstGeom prst="flowChartPredefinedProcess">
+            <a:avLst/>
+          </a:prstGeom>
+        </p:spPr>
+        <p:style>
+          <a:lnRef idx="2">
+            <a:schemeClr val="accent1">
+              <a:shade val="50000"/>
+            </a:schemeClr>
+          </a:lnRef>
+          <a:fillRef idx="1">
+            <a:schemeClr val="accent1"/>
+          </a:fillRef>
+          <a:effectRef idx="0">
+            <a:schemeClr val="accent1"/>
+          </a:effectRef>
+          <a:fontRef idx="minor">
+            <a:schemeClr val="lt1"/>
+          </a:fontRef>
+        </p:style>
+        <p:txBody>
+          <a:bodyPr rtlCol="0" anchor="ctr"/>
+          <a:lstStyle/>
+          <a:p>
+            <a:pPr algn="ctr"/>
+            <a:r>
+              <a:rPr lang="en-US" sz="1600" dirty="0"/>
+              <a:t>Train</a:t>
+            </a:r>
+          </a:p>
+          <a:p>
+            <a:pPr algn="ctr"/>
+            <a:r>
+              <a:rPr lang="en-US" sz="1600" dirty="0"/>
+              <a:t>Model</a:t>
+            </a:r>
+          </a:p>
+        </p:txBody>
+      </p:sp>
+      <p:sp>
+        <p:nvSpPr>
+          <p:cNvPr id="117" name="Flowchart: Predefined Process 116">
+            <a:extLst>
+              <a:ext uri="{FF2B5EF4-FFF2-40B4-BE49-F238E27FC236}">
+                <a16:creationId xmlns:a16="http://schemas.microsoft.com/office/drawing/2014/main" id="{4774CBCB-E5FD-4826-846F-8ABD19512C52}"/>
+              </a:ext>
+            </a:extLst>
+          </p:cNvPr>
+          <p:cNvSpPr/>
+          <p:nvPr/>
+        </p:nvSpPr>
+        <p:spPr>
+          <a:xfrm>
+            <a:off x="7330529" y="3842118"/>
+            <a:ext cx="1175809" cy="517150"/>
+          </a:xfrm>
+          <a:prstGeom prst="flowChartPredefinedProcess">
+            <a:avLst/>
+          </a:prstGeom>
+        </p:spPr>
+        <p:style>
+          <a:lnRef idx="2">
+            <a:schemeClr val="accent1">
+              <a:shade val="50000"/>
+            </a:schemeClr>
+          </a:lnRef>
+          <a:fillRef idx="1">
+            <a:schemeClr val="accent1"/>
+          </a:fillRef>
+          <a:effectRef idx="0">
+            <a:schemeClr val="accent1"/>
+          </a:effectRef>
+          <a:fontRef idx="minor">
+            <a:schemeClr val="lt1"/>
+          </a:fontRef>
+        </p:style>
+        <p:txBody>
+          <a:bodyPr rtlCol="0" anchor="ctr"/>
+          <a:lstStyle/>
+          <a:p>
+            <a:pPr algn="ctr"/>
+            <a:r>
+              <a:rPr lang="en-US" sz="1600" dirty="0"/>
+              <a:t>Evaluate</a:t>
+            </a:r>
+          </a:p>
+          <a:p>
+            <a:pPr algn="ctr"/>
+            <a:r>
+              <a:rPr lang="en-US" sz="1600" dirty="0"/>
+              <a:t>Model</a:t>
+            </a:r>
+          </a:p>
+        </p:txBody>
+      </p:sp>
+      <p:cxnSp>
+        <p:nvCxnSpPr>
+          <p:cNvPr id="118" name="Connector: Elbow 117">
+            <a:extLst>
+              <a:ext uri="{FF2B5EF4-FFF2-40B4-BE49-F238E27FC236}">
+                <a16:creationId xmlns:a16="http://schemas.microsoft.com/office/drawing/2014/main" id="{BF3EE74C-F3F1-47A3-9416-358552F2DA50}"/>
+              </a:ext>
+            </a:extLst>
+          </p:cNvPr>
+          <p:cNvCxnSpPr>
+            <a:cxnSpLocks/>
+            <a:stCxn id="110" idx="3"/>
+            <a:endCxn id="116" idx="1"/>
+          </p:cNvCxnSpPr>
+          <p:nvPr/>
+        </p:nvCxnSpPr>
+        <p:spPr>
+          <a:xfrm>
+            <a:off x="7096803" y="3301958"/>
+            <a:ext cx="219212" cy="12096"/>
+          </a:xfrm>
+          <a:prstGeom prst="bentConnector3">
+            <a:avLst>
+              <a:gd name="adj1" fmla="val 50000"/>
+            </a:avLst>
+          </a:prstGeom>
+          <a:ln w="53975">
+            <a:solidFill>
+              <a:srgbClr val="FFE699"/>
+            </a:solidFill>
+            <a:prstDash val="solid"/>
+            <a:tailEnd type="triangle"/>
+          </a:ln>
+        </p:spPr>
+        <p:style>
+          <a:lnRef idx="1">
+            <a:schemeClr val="accent1"/>
+          </a:lnRef>
+          <a:fillRef idx="0">
+            <a:schemeClr val="accent1"/>
+          </a:fillRef>
+          <a:effectRef idx="0">
+            <a:schemeClr val="accent1"/>
+          </a:effectRef>
+          <a:fontRef idx="minor">
+            <a:schemeClr val="tx1"/>
+          </a:fontRef>
+        </p:style>
+      </p:cxnSp>
+      <p:cxnSp>
+        <p:nvCxnSpPr>
+          <p:cNvPr id="120" name="Connector: Elbow 119">
+            <a:extLst>
+              <a:ext uri="{FF2B5EF4-FFF2-40B4-BE49-F238E27FC236}">
+                <a16:creationId xmlns:a16="http://schemas.microsoft.com/office/drawing/2014/main" id="{6EB9A0EF-89AD-4329-8AA8-444F483B20D2}"/>
+              </a:ext>
+            </a:extLst>
+          </p:cNvPr>
+          <p:cNvCxnSpPr>
+            <a:cxnSpLocks/>
+            <a:stCxn id="116" idx="2"/>
+            <a:endCxn id="117" idx="0"/>
+          </p:cNvCxnSpPr>
+          <p:nvPr/>
+        </p:nvCxnSpPr>
+        <p:spPr>
+          <a:xfrm rot="16200000" flipH="1">
+            <a:off x="7776433" y="3700116"/>
+            <a:ext cx="269489" cy="14514"/>
+          </a:xfrm>
+          <a:prstGeom prst="bentConnector3">
+            <a:avLst>
+              <a:gd name="adj1" fmla="val 50000"/>
+            </a:avLst>
+          </a:prstGeom>
+          <a:ln w="53975">
+            <a:solidFill>
+              <a:srgbClr val="FFE699"/>
+            </a:solidFill>
+            <a:prstDash val="solid"/>
+            <a:tailEnd type="triangle"/>
+          </a:ln>
+        </p:spPr>
+        <p:style>
+          <a:lnRef idx="1">
+            <a:schemeClr val="accent1"/>
+          </a:lnRef>
+          <a:fillRef idx="0">
+            <a:schemeClr val="accent1"/>
+          </a:fillRef>
+          <a:effectRef idx="0">
+            <a:schemeClr val="accent1"/>
+          </a:effectRef>
+          <a:fontRef idx="minor">
+            <a:schemeClr val="tx1"/>
+          </a:fontRef>
+        </p:style>
+      </p:cxnSp>
+      <p:cxnSp>
+        <p:nvCxnSpPr>
+          <p:cNvPr id="125" name="Connector: Elbow 124">
+            <a:extLst>
+              <a:ext uri="{FF2B5EF4-FFF2-40B4-BE49-F238E27FC236}">
+                <a16:creationId xmlns:a16="http://schemas.microsoft.com/office/drawing/2014/main" id="{959D628A-0BC2-4714-AD1A-8A8650356E92}"/>
+              </a:ext>
+            </a:extLst>
+          </p:cNvPr>
+          <p:cNvCxnSpPr>
+            <a:cxnSpLocks/>
+            <a:stCxn id="117" idx="1"/>
+            <a:endCxn id="110" idx="2"/>
+          </p:cNvCxnSpPr>
+          <p:nvPr/>
+        </p:nvCxnSpPr>
+        <p:spPr>
+          <a:xfrm rot="10800000">
+            <a:off x="6540023" y="3727517"/>
+            <a:ext cx="790506" cy="373177"/>
+          </a:xfrm>
+          <a:prstGeom prst="bentConnector2">
+            <a:avLst/>
+          </a:prstGeom>
+          <a:ln w="53975">
+            <a:solidFill>
+              <a:srgbClr val="FFE699"/>
+            </a:solidFill>
+            <a:prstDash val="solid"/>
+            <a:tailEnd type="triangle"/>
+          </a:ln>
+        </p:spPr>
+        <p:style>
+          <a:lnRef idx="1">
+            <a:schemeClr val="accent1"/>
+          </a:lnRef>
+          <a:fillRef idx="0">
+            <a:schemeClr val="accent1"/>
+          </a:fillRef>
+          <a:effectRef idx="0">
+            <a:schemeClr val="accent1"/>
+          </a:effectRef>
+          <a:fontRef idx="minor">
+            <a:schemeClr val="tx1"/>
+          </a:fontRef>
+        </p:style>
+      </p:cxnSp>
+      <p:cxnSp>
+        <p:nvCxnSpPr>
+          <p:cNvPr id="129" name="Connector: Elbow 128">
+            <a:extLst>
+              <a:ext uri="{FF2B5EF4-FFF2-40B4-BE49-F238E27FC236}">
+                <a16:creationId xmlns:a16="http://schemas.microsoft.com/office/drawing/2014/main" id="{E2CA20D7-C512-4A2A-ACE3-0F650D7CB86B}"/>
+              </a:ext>
+            </a:extLst>
+          </p:cNvPr>
+          <p:cNvCxnSpPr>
+            <a:cxnSpLocks/>
+            <a:endCxn id="153" idx="3"/>
+          </p:cNvCxnSpPr>
+          <p:nvPr/>
+        </p:nvCxnSpPr>
+        <p:spPr>
+          <a:xfrm rot="10800000" flipV="1">
+            <a:off x="6892901" y="3574564"/>
+            <a:ext cx="2649813" cy="1104736"/>
+          </a:xfrm>
+          <a:prstGeom prst="bentConnector3">
+            <a:avLst>
+              <a:gd name="adj1" fmla="val -324"/>
+            </a:avLst>
+          </a:prstGeom>
+          <a:ln w="53975">
+            <a:solidFill>
+              <a:srgbClr val="FFE699"/>
+            </a:solidFill>
+            <a:prstDash val="solid"/>
+            <a:tailEnd type="triangle"/>
+          </a:ln>
+        </p:spPr>
+        <p:style>
+          <a:lnRef idx="1">
+            <a:schemeClr val="accent1"/>
+          </a:lnRef>
+          <a:fillRef idx="0">
+            <a:schemeClr val="accent1"/>
+          </a:fillRef>
+          <a:effectRef idx="0">
+            <a:schemeClr val="accent1"/>
+          </a:effectRef>
+          <a:fontRef idx="minor">
+            <a:schemeClr val="tx1"/>
+          </a:fontRef>
+        </p:style>
+      </p:cxnSp>
+      <p:cxnSp>
+        <p:nvCxnSpPr>
+          <p:cNvPr id="138" name="Connector: Elbow 137">
+            <a:extLst>
+              <a:ext uri="{FF2B5EF4-FFF2-40B4-BE49-F238E27FC236}">
+                <a16:creationId xmlns:a16="http://schemas.microsoft.com/office/drawing/2014/main" id="{C03B1F74-6A2B-440A-9ED3-FD0FF367C84B}"/>
+              </a:ext>
+            </a:extLst>
+          </p:cNvPr>
+          <p:cNvCxnSpPr>
+            <a:cxnSpLocks/>
+            <a:stCxn id="116" idx="3"/>
+            <a:endCxn id="115" idx="1"/>
+          </p:cNvCxnSpPr>
+          <p:nvPr/>
+        </p:nvCxnSpPr>
+        <p:spPr>
+          <a:xfrm>
+            <a:off x="8491824" y="3314054"/>
+            <a:ext cx="431673" cy="905"/>
+          </a:xfrm>
+          <a:prstGeom prst="bentConnector3">
+            <a:avLst>
+              <a:gd name="adj1" fmla="val 50000"/>
+            </a:avLst>
+          </a:prstGeom>
+          <a:ln w="53975">
+            <a:solidFill>
+              <a:srgbClr val="FFE699"/>
+            </a:solidFill>
+            <a:prstDash val="solid"/>
+            <a:tailEnd type="triangle"/>
+          </a:ln>
+        </p:spPr>
+        <p:style>
+          <a:lnRef idx="1">
+            <a:schemeClr val="accent1"/>
+          </a:lnRef>
+          <a:fillRef idx="0">
+            <a:schemeClr val="accent1"/>
+          </a:fillRef>
+          <a:effectRef idx="0">
+            <a:schemeClr val="accent1"/>
+          </a:effectRef>
+          <a:fontRef idx="minor">
+            <a:schemeClr val="tx1"/>
+          </a:fontRef>
+        </p:style>
+      </p:cxnSp>
+      <p:sp>
+        <p:nvSpPr>
+          <p:cNvPr id="134" name="Arrow: Curved Down 133">
+            <a:extLst>
+              <a:ext uri="{FF2B5EF4-FFF2-40B4-BE49-F238E27FC236}">
+                <a16:creationId xmlns:a16="http://schemas.microsoft.com/office/drawing/2014/main" id="{224B8B3C-AC03-4FD7-81DE-064F1A3F7F74}"/>
+              </a:ext>
+            </a:extLst>
+          </p:cNvPr>
+          <p:cNvSpPr/>
+          <p:nvPr/>
+        </p:nvSpPr>
+        <p:spPr>
+          <a:xfrm>
+            <a:off x="544460" y="5695208"/>
+            <a:ext cx="736360" cy="310305"/>
+          </a:xfrm>
+          <a:prstGeom prst="curvedDownArrow">
+            <a:avLst>
+              <a:gd name="adj1" fmla="val 47237"/>
+              <a:gd name="adj2" fmla="val 105694"/>
+              <a:gd name="adj3" fmla="val 51091"/>
+            </a:avLst>
+          </a:prstGeom>
+          <a:solidFill>
+            <a:srgbClr val="FFE699"/>
+          </a:solidFill>
+          <a:ln>
+            <a:solidFill>
+              <a:schemeClr val="accent4">
+                <a:lumMod val="40000"/>
+                <a:lumOff val="60000"/>
+              </a:schemeClr>
+            </a:solidFill>
+          </a:ln>
+        </p:spPr>
+        <p:style>
+          <a:lnRef idx="2">
+            <a:schemeClr val="accent1">
+              <a:shade val="50000"/>
+            </a:schemeClr>
+          </a:lnRef>
+          <a:fillRef idx="1">
+            <a:schemeClr val="accent1"/>
+          </a:fillRef>
+          <a:effectRef idx="0">
+            <a:schemeClr val="accent1"/>
+          </a:effectRef>
+          <a:fontRef idx="minor">
+            <a:schemeClr val="lt1"/>
+          </a:fontRef>
+        </p:style>
+        <p:txBody>
+          <a:bodyPr rtlCol="0" anchor="ctr"/>
+          <a:lstStyle/>
+          <a:p>
+            <a:pPr algn="ctr"/>
+            <a:endParaRPr lang="en-US">
+              <a:solidFill>
+                <a:schemeClr val="tx1"/>
+              </a:solidFill>
+            </a:endParaRPr>
+          </a:p>
+        </p:txBody>
+      </p:sp>
+      <p:sp>
+        <p:nvSpPr>
+          <p:cNvPr id="145" name="Arrow: Curved Down 144">
+            <a:extLst>
+              <a:ext uri="{FF2B5EF4-FFF2-40B4-BE49-F238E27FC236}">
+                <a16:creationId xmlns:a16="http://schemas.microsoft.com/office/drawing/2014/main" id="{93294A28-C3D5-4BFC-BF31-4D67B52216E8}"/>
+              </a:ext>
+            </a:extLst>
+          </p:cNvPr>
+          <p:cNvSpPr/>
+          <p:nvPr/>
+        </p:nvSpPr>
+        <p:spPr>
+          <a:xfrm rot="11430982">
+            <a:off x="445890" y="5959324"/>
+            <a:ext cx="736360" cy="310305"/>
+          </a:xfrm>
+          <a:prstGeom prst="curvedDownArrow">
+            <a:avLst>
+              <a:gd name="adj1" fmla="val 49940"/>
+              <a:gd name="adj2" fmla="val 105694"/>
+              <a:gd name="adj3" fmla="val 57557"/>
+            </a:avLst>
+          </a:prstGeom>
+          <a:solidFill>
+            <a:srgbClr val="FFE699"/>
+          </a:solidFill>
+          <a:ln>
+            <a:solidFill>
+              <a:schemeClr val="accent4">
+                <a:lumMod val="40000"/>
+                <a:lumOff val="60000"/>
+              </a:schemeClr>
+            </a:solidFill>
+          </a:ln>
+        </p:spPr>
+        <p:style>
+          <a:lnRef idx="2">
+            <a:schemeClr val="accent1">
+              <a:shade val="50000"/>
+            </a:schemeClr>
+          </a:lnRef>
+          <a:fillRef idx="1">
+            <a:schemeClr val="accent1"/>
+          </a:fillRef>
+          <a:effectRef idx="0">
+            <a:schemeClr val="accent1"/>
+          </a:effectRef>
+          <a:fontRef idx="minor">
+            <a:schemeClr val="lt1"/>
+          </a:fontRef>
+        </p:style>
+        <p:txBody>
+          <a:bodyPr rtlCol="0" anchor="ctr"/>
+          <a:lstStyle/>
+          <a:p>
+            <a:pPr algn="ctr"/>
+            <a:endParaRPr lang="en-US" dirty="0">
+              <a:solidFill>
+                <a:schemeClr val="tx1"/>
+              </a:solidFill>
+            </a:endParaRPr>
+          </a:p>
+        </p:txBody>
+      </p:sp>
+      <p:pic>
+        <p:nvPicPr>
+          <p:cNvPr id="135" name="Picture 134">
+            <a:extLst>
+              <a:ext uri="{FF2B5EF4-FFF2-40B4-BE49-F238E27FC236}">
+                <a16:creationId xmlns:a16="http://schemas.microsoft.com/office/drawing/2014/main" id="{75623409-67D8-468B-9480-8A16769CEB71}"/>
+              </a:ext>
+            </a:extLst>
+          </p:cNvPr>
+          <p:cNvPicPr>
+            <a:picLocks noChangeAspect="1"/>
+          </p:cNvPicPr>
+          <p:nvPr/>
+        </p:nvPicPr>
+        <p:blipFill>
+          <a:blip r:embed="rId2"/>
+          <a:stretch>
+            <a:fillRect/>
+          </a:stretch>
+        </p:blipFill>
+        <p:spPr>
+          <a:xfrm>
+            <a:off x="4905887" y="4007291"/>
+            <a:ext cx="786452" cy="615749"/>
+          </a:xfrm>
+          <a:prstGeom prst="rect">
+            <a:avLst/>
+          </a:prstGeom>
+        </p:spPr>
+      </p:pic>
+      <p:pic>
+        <p:nvPicPr>
+          <p:cNvPr id="147" name="Picture 146">
+            <a:extLst>
+              <a:ext uri="{FF2B5EF4-FFF2-40B4-BE49-F238E27FC236}">
+                <a16:creationId xmlns:a16="http://schemas.microsoft.com/office/drawing/2014/main" id="{C2BD2659-9A8D-43AA-8363-F443515ADFED}"/>
+              </a:ext>
+            </a:extLst>
+          </p:cNvPr>
+          <p:cNvPicPr>
+            <a:picLocks noChangeAspect="1"/>
+          </p:cNvPicPr>
+          <p:nvPr/>
+        </p:nvPicPr>
+        <p:blipFill>
+          <a:blip r:embed="rId2"/>
+          <a:stretch>
+            <a:fillRect/>
+          </a:stretch>
+        </p:blipFill>
+        <p:spPr>
+          <a:xfrm>
+            <a:off x="6796896" y="3400987"/>
+            <a:ext cx="786452" cy="615749"/>
+          </a:xfrm>
+          <a:prstGeom prst="rect">
+            <a:avLst/>
+          </a:prstGeom>
+        </p:spPr>
+      </p:pic>
+      <p:sp>
+        <p:nvSpPr>
+          <p:cNvPr id="153" name="Flowchart: Predefined Process 152">
+            <a:extLst>
+              <a:ext uri="{FF2B5EF4-FFF2-40B4-BE49-F238E27FC236}">
+                <a16:creationId xmlns:a16="http://schemas.microsoft.com/office/drawing/2014/main" id="{49E7E9F2-9F08-4990-AF13-35FBBA95E264}"/>
+              </a:ext>
+            </a:extLst>
+          </p:cNvPr>
+          <p:cNvSpPr/>
+          <p:nvPr/>
+        </p:nvSpPr>
+        <p:spPr>
+          <a:xfrm>
+            <a:off x="5717091" y="4420725"/>
+            <a:ext cx="1175809" cy="517150"/>
+          </a:xfrm>
+          <a:prstGeom prst="flowChartPredefinedProcess">
+            <a:avLst/>
+          </a:prstGeom>
+        </p:spPr>
+        <p:style>
+          <a:lnRef idx="2">
+            <a:schemeClr val="accent1">
+              <a:shade val="50000"/>
+            </a:schemeClr>
+          </a:lnRef>
+          <a:fillRef idx="1">
+            <a:schemeClr val="accent1"/>
+          </a:fillRef>
+          <a:effectRef idx="0">
+            <a:schemeClr val="accent1"/>
+          </a:effectRef>
+          <a:fontRef idx="minor">
+            <a:schemeClr val="lt1"/>
+          </a:fontRef>
+        </p:style>
+        <p:txBody>
+          <a:bodyPr rtlCol="0" anchor="ctr"/>
+          <a:lstStyle/>
+          <a:p>
+            <a:pPr algn="ctr"/>
+            <a:r>
+              <a:rPr lang="en-US" sz="1600" dirty="0"/>
+              <a:t>Tuner</a:t>
+            </a:r>
+            <a:br>
+              <a:rPr lang="en-US" sz="1600" dirty="0"/>
+            </a:br>
+            <a:r>
+              <a:rPr lang="en-US" sz="1600" dirty="0"/>
+              <a:t>Adjust</a:t>
+            </a:r>
+          </a:p>
+        </p:txBody>
+      </p:sp>
+      <p:cxnSp>
+        <p:nvCxnSpPr>
+          <p:cNvPr id="154" name="Connector: Elbow 153">
+            <a:extLst>
+              <a:ext uri="{FF2B5EF4-FFF2-40B4-BE49-F238E27FC236}">
+                <a16:creationId xmlns:a16="http://schemas.microsoft.com/office/drawing/2014/main" id="{0880C970-5CBD-456A-AADF-BF19880BDE6E}"/>
+              </a:ext>
+            </a:extLst>
+          </p:cNvPr>
+          <p:cNvCxnSpPr>
+            <a:cxnSpLocks/>
+            <a:stCxn id="153" idx="1"/>
+            <a:endCxn id="98" idx="2"/>
+          </p:cNvCxnSpPr>
+          <p:nvPr/>
+        </p:nvCxnSpPr>
+        <p:spPr>
+          <a:xfrm rot="10800000">
+            <a:off x="4875781" y="2813516"/>
+            <a:ext cx="841311" cy="1865785"/>
+          </a:xfrm>
+          <a:prstGeom prst="bentConnector2">
+            <a:avLst/>
+          </a:prstGeom>
+          <a:ln w="53975">
+            <a:solidFill>
+              <a:srgbClr val="FFE699"/>
+            </a:solidFill>
+            <a:prstDash val="solid"/>
+            <a:tailEnd type="triangle"/>
+          </a:ln>
+        </p:spPr>
+        <p:style>
+          <a:lnRef idx="1">
+            <a:schemeClr val="accent1"/>
+          </a:lnRef>
+          <a:fillRef idx="0">
+            <a:schemeClr val="accent1"/>
+          </a:fillRef>
+          <a:effectRef idx="0">
+            <a:schemeClr val="accent1"/>
+          </a:effectRef>
+          <a:fontRef idx="minor">
+            <a:schemeClr val="tx1"/>
+          </a:fontRef>
+        </p:style>
+      </p:cxnSp>
+      <p:sp>
+        <p:nvSpPr>
+          <p:cNvPr id="170" name="Arrow: Pentagon 169">
+            <a:extLst>
+              <a:ext uri="{FF2B5EF4-FFF2-40B4-BE49-F238E27FC236}">
+                <a16:creationId xmlns:a16="http://schemas.microsoft.com/office/drawing/2014/main" id="{FF166124-9CA8-443F-8B6C-7BADBA21A4DE}"/>
+              </a:ext>
+            </a:extLst>
+          </p:cNvPr>
+          <p:cNvSpPr/>
+          <p:nvPr/>
+        </p:nvSpPr>
+        <p:spPr>
+          <a:xfrm>
+            <a:off x="3378621" y="3821272"/>
+            <a:ext cx="1047413" cy="581974"/>
+          </a:xfrm>
+          <a:prstGeom prst="homePlate">
+            <a:avLst>
+              <a:gd name="adj" fmla="val 23376"/>
+            </a:avLst>
+          </a:prstGeom>
+        </p:spPr>
+        <p:style>
+          <a:lnRef idx="2">
+            <a:schemeClr val="accent1">
+              <a:shade val="50000"/>
+            </a:schemeClr>
+          </a:lnRef>
+          <a:fillRef idx="1">
+            <a:schemeClr val="accent1"/>
+          </a:fillRef>
+          <a:effectRef idx="0">
+            <a:schemeClr val="accent1"/>
+          </a:effectRef>
+          <a:fontRef idx="minor">
+            <a:schemeClr val="lt1"/>
+          </a:fontRef>
+        </p:style>
+        <p:txBody>
+          <a:bodyPr rtlCol="0" anchor="ctr"/>
+          <a:lstStyle/>
+          <a:p>
+            <a:pPr algn="ctr"/>
+            <a:r>
+              <a:rPr lang="en-US" sz="1400" dirty="0"/>
+              <a:t>Testing Data</a:t>
+            </a:r>
+          </a:p>
+        </p:txBody>
+      </p:sp>
+      <p:sp>
+        <p:nvSpPr>
+          <p:cNvPr id="171" name="Arrow: Pentagon 170">
+            <a:extLst>
+              <a:ext uri="{FF2B5EF4-FFF2-40B4-BE49-F238E27FC236}">
+                <a16:creationId xmlns:a16="http://schemas.microsoft.com/office/drawing/2014/main" id="{EBDF3E6D-01BC-422C-AA8F-48D97D8ACACE}"/>
+              </a:ext>
+            </a:extLst>
+          </p:cNvPr>
+          <p:cNvSpPr/>
+          <p:nvPr/>
+        </p:nvSpPr>
+        <p:spPr>
+          <a:xfrm>
+            <a:off x="3355554" y="2564741"/>
+            <a:ext cx="1047413" cy="581974"/>
+          </a:xfrm>
+          <a:prstGeom prst="homePlate">
+            <a:avLst>
+              <a:gd name="adj" fmla="val 23376"/>
+            </a:avLst>
+          </a:prstGeom>
+        </p:spPr>
+        <p:style>
+          <a:lnRef idx="2">
+            <a:schemeClr val="accent1">
+              <a:shade val="50000"/>
+            </a:schemeClr>
+          </a:lnRef>
+          <a:fillRef idx="1">
+            <a:schemeClr val="accent1"/>
+          </a:fillRef>
+          <a:effectRef idx="0">
+            <a:schemeClr val="accent1"/>
+          </a:effectRef>
+          <a:fontRef idx="minor">
+            <a:schemeClr val="lt1"/>
+          </a:fontRef>
+        </p:style>
+        <p:txBody>
+          <a:bodyPr rtlCol="0" anchor="ctr"/>
+          <a:lstStyle/>
+          <a:p>
+            <a:pPr algn="ctr"/>
+            <a:r>
+              <a:rPr lang="en-US" sz="1400" dirty="0"/>
+              <a:t>Training Data</a:t>
+            </a:r>
+          </a:p>
+        </p:txBody>
+      </p:sp>
+      <p:sp>
+        <p:nvSpPr>
+          <p:cNvPr id="172" name="Arrow: Pentagon 171">
+            <a:extLst>
+              <a:ext uri="{FF2B5EF4-FFF2-40B4-BE49-F238E27FC236}">
+                <a16:creationId xmlns:a16="http://schemas.microsoft.com/office/drawing/2014/main" id="{05CFDD44-B098-4A62-BC65-FD595AE63958}"/>
+              </a:ext>
+            </a:extLst>
+          </p:cNvPr>
+          <p:cNvSpPr/>
+          <p:nvPr/>
+        </p:nvSpPr>
+        <p:spPr>
+          <a:xfrm>
+            <a:off x="3355554" y="3196644"/>
+            <a:ext cx="1047413" cy="581974"/>
+          </a:xfrm>
+          <a:prstGeom prst="homePlate">
+            <a:avLst>
+              <a:gd name="adj" fmla="val 23376"/>
+            </a:avLst>
+          </a:prstGeom>
+        </p:spPr>
+        <p:style>
+          <a:lnRef idx="2">
+            <a:schemeClr val="accent1">
+              <a:shade val="50000"/>
+            </a:schemeClr>
+          </a:lnRef>
+          <a:fillRef idx="1">
+            <a:schemeClr val="accent1"/>
+          </a:fillRef>
+          <a:effectRef idx="0">
+            <a:schemeClr val="accent1"/>
+          </a:effectRef>
+          <a:fontRef idx="minor">
+            <a:schemeClr val="lt1"/>
+          </a:fontRef>
+        </p:style>
+        <p:txBody>
+          <a:bodyPr rtlCol="0" anchor="ctr"/>
+          <a:lstStyle/>
+          <a:p>
+            <a:pPr algn="ctr"/>
+            <a:r>
+              <a:rPr lang="en-US" sz="1400" dirty="0"/>
+              <a:t>Validation Data</a:t>
+            </a:r>
+          </a:p>
+        </p:txBody>
+      </p:sp>
+      <p:cxnSp>
+        <p:nvCxnSpPr>
+          <p:cNvPr id="176" name="Connector: Elbow 175">
+            <a:extLst>
+              <a:ext uri="{FF2B5EF4-FFF2-40B4-BE49-F238E27FC236}">
+                <a16:creationId xmlns:a16="http://schemas.microsoft.com/office/drawing/2014/main" id="{6EAEA3BB-A765-46B5-A916-0A6E72712184}"/>
+              </a:ext>
+            </a:extLst>
+          </p:cNvPr>
+          <p:cNvCxnSpPr>
+            <a:cxnSpLocks/>
+            <a:stCxn id="42" idx="3"/>
+            <a:endCxn id="52" idx="0"/>
+          </p:cNvCxnSpPr>
+          <p:nvPr/>
+        </p:nvCxnSpPr>
+        <p:spPr>
+          <a:xfrm>
+            <a:off x="2228222" y="2483812"/>
+            <a:ext cx="234623" cy="445841"/>
+          </a:xfrm>
+          <a:prstGeom prst="bentConnector2">
+            <a:avLst/>
+          </a:prstGeom>
+          <a:ln w="63500">
+            <a:solidFill>
+              <a:srgbClr val="7030A0"/>
+            </a:solidFill>
+            <a:prstDash val="sysDot"/>
+            <a:tailEnd type="triangle"/>
+          </a:ln>
+        </p:spPr>
+        <p:style>
+          <a:lnRef idx="1">
+            <a:schemeClr val="accent1"/>
+          </a:lnRef>
+          <a:fillRef idx="0">
+            <a:schemeClr val="accent1"/>
+          </a:fillRef>
+          <a:effectRef idx="0">
+            <a:schemeClr val="accent1"/>
+          </a:effectRef>
+          <a:fontRef idx="minor">
+            <a:schemeClr val="tx1"/>
+          </a:fontRef>
+        </p:style>
+      </p:cxnSp>
+      <p:cxnSp>
+        <p:nvCxnSpPr>
+          <p:cNvPr id="179" name="Connector: Elbow 178">
+            <a:extLst>
+              <a:ext uri="{FF2B5EF4-FFF2-40B4-BE49-F238E27FC236}">
+                <a16:creationId xmlns:a16="http://schemas.microsoft.com/office/drawing/2014/main" id="{787B47CE-720D-476F-A9F1-5D96F514B2AA}"/>
+              </a:ext>
+            </a:extLst>
+          </p:cNvPr>
+          <p:cNvCxnSpPr>
+            <a:cxnSpLocks/>
+            <a:stCxn id="66" idx="0"/>
+            <a:endCxn id="52" idx="2"/>
+          </p:cNvCxnSpPr>
+          <p:nvPr/>
+        </p:nvCxnSpPr>
+        <p:spPr>
+          <a:xfrm rot="5400000" flipH="1" flipV="1">
+            <a:off x="2102530" y="4376504"/>
+            <a:ext cx="716866" cy="3764"/>
+          </a:xfrm>
+          <a:prstGeom prst="bentConnector3">
+            <a:avLst>
+              <a:gd name="adj1" fmla="val 50000"/>
+            </a:avLst>
+          </a:prstGeom>
+          <a:ln w="63500">
+            <a:solidFill>
+              <a:srgbClr val="7030A0"/>
+            </a:solidFill>
+            <a:prstDash val="sysDot"/>
+            <a:tailEnd type="triangle"/>
+          </a:ln>
+        </p:spPr>
+        <p:style>
+          <a:lnRef idx="1">
+            <a:schemeClr val="accent1"/>
+          </a:lnRef>
+          <a:fillRef idx="0">
+            <a:schemeClr val="accent1"/>
+          </a:fillRef>
+          <a:effectRef idx="0">
+            <a:schemeClr val="accent1"/>
+          </a:effectRef>
+          <a:fontRef idx="minor">
+            <a:schemeClr val="tx1"/>
+          </a:fontRef>
+        </p:style>
+      </p:cxnSp>
+      <p:cxnSp>
+        <p:nvCxnSpPr>
+          <p:cNvPr id="184" name="Connector: Elbow 183">
+            <a:extLst>
+              <a:ext uri="{FF2B5EF4-FFF2-40B4-BE49-F238E27FC236}">
+                <a16:creationId xmlns:a16="http://schemas.microsoft.com/office/drawing/2014/main" id="{E5640A21-66A1-44D9-9ED3-32609AB9274F}"/>
+              </a:ext>
+            </a:extLst>
+          </p:cNvPr>
+          <p:cNvCxnSpPr>
+            <a:cxnSpLocks/>
+            <a:stCxn id="52" idx="3"/>
+            <a:endCxn id="170" idx="1"/>
+          </p:cNvCxnSpPr>
+          <p:nvPr/>
+        </p:nvCxnSpPr>
+        <p:spPr>
+          <a:xfrm>
+            <a:off x="3108973" y="3474803"/>
+            <a:ext cx="269648" cy="637456"/>
+          </a:xfrm>
+          <a:prstGeom prst="bentConnector3">
+            <a:avLst>
+              <a:gd name="adj1" fmla="val -1808"/>
+            </a:avLst>
+          </a:prstGeom>
+          <a:ln w="63500">
+            <a:solidFill>
+              <a:srgbClr val="7030A0"/>
+            </a:solidFill>
+            <a:prstDash val="sysDot"/>
+            <a:tailEnd type="triangle"/>
+          </a:ln>
+        </p:spPr>
+        <p:style>
+          <a:lnRef idx="1">
+            <a:schemeClr val="accent1"/>
+          </a:lnRef>
+          <a:fillRef idx="0">
+            <a:schemeClr val="accent1"/>
+          </a:fillRef>
+          <a:effectRef idx="0">
+            <a:schemeClr val="accent1"/>
+          </a:effectRef>
+          <a:fontRef idx="minor">
+            <a:schemeClr val="tx1"/>
+          </a:fontRef>
+        </p:style>
+      </p:cxnSp>
+      <p:cxnSp>
+        <p:nvCxnSpPr>
+          <p:cNvPr id="189" name="Connector: Elbow 188">
+            <a:extLst>
+              <a:ext uri="{FF2B5EF4-FFF2-40B4-BE49-F238E27FC236}">
+                <a16:creationId xmlns:a16="http://schemas.microsoft.com/office/drawing/2014/main" id="{F7975917-2A50-4F0B-967B-A16ECA7DEE23}"/>
+              </a:ext>
+            </a:extLst>
+          </p:cNvPr>
+          <p:cNvCxnSpPr>
+            <a:cxnSpLocks/>
+            <a:stCxn id="52" idx="3"/>
+            <a:endCxn id="171" idx="1"/>
+          </p:cNvCxnSpPr>
+          <p:nvPr/>
+        </p:nvCxnSpPr>
+        <p:spPr>
+          <a:xfrm flipV="1">
+            <a:off x="3108973" y="2855728"/>
+            <a:ext cx="246581" cy="619075"/>
+          </a:xfrm>
+          <a:prstGeom prst="bentConnector3">
+            <a:avLst>
+              <a:gd name="adj1" fmla="val -6655"/>
+            </a:avLst>
+          </a:prstGeom>
+          <a:ln w="63500">
+            <a:solidFill>
+              <a:srgbClr val="7030A0"/>
+            </a:solidFill>
+            <a:prstDash val="sysDot"/>
+            <a:tailEnd type="triangle"/>
+          </a:ln>
+        </p:spPr>
+        <p:style>
+          <a:lnRef idx="1">
+            <a:schemeClr val="accent1"/>
+          </a:lnRef>
+          <a:fillRef idx="0">
+            <a:schemeClr val="accent1"/>
+          </a:fillRef>
+          <a:effectRef idx="0">
+            <a:schemeClr val="accent1"/>
+          </a:effectRef>
+          <a:fontRef idx="minor">
+            <a:schemeClr val="tx1"/>
+          </a:fontRef>
+        </p:style>
+      </p:cxnSp>
+      <p:cxnSp>
+        <p:nvCxnSpPr>
+          <p:cNvPr id="193" name="Connector: Elbow 192">
+            <a:extLst>
+              <a:ext uri="{FF2B5EF4-FFF2-40B4-BE49-F238E27FC236}">
+                <a16:creationId xmlns:a16="http://schemas.microsoft.com/office/drawing/2014/main" id="{424003D7-47FB-4858-89FE-CB3988E2CB3D}"/>
+              </a:ext>
+            </a:extLst>
+          </p:cNvPr>
+          <p:cNvCxnSpPr>
+            <a:cxnSpLocks/>
+            <a:stCxn id="52" idx="3"/>
+            <a:endCxn id="172" idx="1"/>
+          </p:cNvCxnSpPr>
+          <p:nvPr/>
+        </p:nvCxnSpPr>
+        <p:spPr>
+          <a:xfrm>
+            <a:off x="3108973" y="3474803"/>
+            <a:ext cx="246581" cy="12828"/>
+          </a:xfrm>
+          <a:prstGeom prst="bentConnector3">
+            <a:avLst>
+              <a:gd name="adj1" fmla="val 50000"/>
+            </a:avLst>
+          </a:prstGeom>
+          <a:ln w="63500">
+            <a:solidFill>
+              <a:srgbClr val="7030A0"/>
+            </a:solidFill>
+            <a:prstDash val="sysDot"/>
+            <a:tailEnd type="triangle"/>
+          </a:ln>
+        </p:spPr>
+        <p:style>
+          <a:lnRef idx="1">
+            <a:schemeClr val="accent1"/>
+          </a:lnRef>
+          <a:fillRef idx="0">
+            <a:schemeClr val="accent1"/>
+          </a:fillRef>
+          <a:effectRef idx="0">
+            <a:schemeClr val="accent1"/>
+          </a:effectRef>
+          <a:fontRef idx="minor">
+            <a:schemeClr val="tx1"/>
+          </a:fontRef>
+        </p:style>
+      </p:cxnSp>
+      <p:cxnSp>
+        <p:nvCxnSpPr>
+          <p:cNvPr id="198" name="Connector: Elbow 197">
+            <a:extLst>
+              <a:ext uri="{FF2B5EF4-FFF2-40B4-BE49-F238E27FC236}">
+                <a16:creationId xmlns:a16="http://schemas.microsoft.com/office/drawing/2014/main" id="{3A436A76-7270-4D53-8636-CC885AE0DC67}"/>
+              </a:ext>
+            </a:extLst>
+          </p:cNvPr>
+          <p:cNvCxnSpPr>
+            <a:cxnSpLocks/>
+            <a:stCxn id="171" idx="3"/>
+            <a:endCxn id="116" idx="0"/>
+          </p:cNvCxnSpPr>
+          <p:nvPr/>
+        </p:nvCxnSpPr>
+        <p:spPr>
+          <a:xfrm>
+            <a:off x="4402967" y="2855728"/>
+            <a:ext cx="3500953" cy="199751"/>
+          </a:xfrm>
+          <a:prstGeom prst="bentConnector2">
+            <a:avLst/>
+          </a:prstGeom>
+          <a:ln w="63500">
+            <a:solidFill>
+              <a:srgbClr val="7030A0"/>
+            </a:solidFill>
+            <a:prstDash val="sysDot"/>
+            <a:tailEnd type="triangle"/>
+          </a:ln>
+        </p:spPr>
+        <p:style>
+          <a:lnRef idx="1">
+            <a:schemeClr val="accent1"/>
+          </a:lnRef>
+          <a:fillRef idx="0">
+            <a:schemeClr val="accent1"/>
+          </a:fillRef>
+          <a:effectRef idx="0">
+            <a:schemeClr val="accent1"/>
+          </a:effectRef>
+          <a:fontRef idx="minor">
+            <a:schemeClr val="tx1"/>
+          </a:fontRef>
+        </p:style>
+      </p:cxnSp>
+      <p:cxnSp>
+        <p:nvCxnSpPr>
+          <p:cNvPr id="201" name="Connector: Elbow 200">
+            <a:extLst>
+              <a:ext uri="{FF2B5EF4-FFF2-40B4-BE49-F238E27FC236}">
+                <a16:creationId xmlns:a16="http://schemas.microsoft.com/office/drawing/2014/main" id="{708FD943-F9B3-4741-975E-B93E2EE8A92C}"/>
+              </a:ext>
+            </a:extLst>
+          </p:cNvPr>
+          <p:cNvCxnSpPr>
+            <a:cxnSpLocks/>
+            <a:stCxn id="172" idx="3"/>
+          </p:cNvCxnSpPr>
+          <p:nvPr/>
+        </p:nvCxnSpPr>
+        <p:spPr>
+          <a:xfrm>
+            <a:off x="4402967" y="3487631"/>
+            <a:ext cx="2927562" cy="752769"/>
+          </a:xfrm>
+          <a:prstGeom prst="bentConnector3">
+            <a:avLst>
+              <a:gd name="adj1" fmla="val 50000"/>
+            </a:avLst>
+          </a:prstGeom>
+          <a:ln w="63500">
+            <a:solidFill>
+              <a:srgbClr val="7030A0"/>
+            </a:solidFill>
+            <a:prstDash val="sysDot"/>
+            <a:tailEnd type="triangle"/>
+          </a:ln>
+        </p:spPr>
+        <p:style>
+          <a:lnRef idx="1">
+            <a:schemeClr val="accent1"/>
+          </a:lnRef>
+          <a:fillRef idx="0">
+            <a:schemeClr val="accent1"/>
+          </a:fillRef>
+          <a:effectRef idx="0">
+            <a:schemeClr val="accent1"/>
+          </a:effectRef>
+          <a:fontRef idx="minor">
+            <a:schemeClr val="tx1"/>
+          </a:fontRef>
+        </p:style>
+      </p:cxnSp>
+      <p:cxnSp>
+        <p:nvCxnSpPr>
+          <p:cNvPr id="205" name="Connector: Elbow 204">
+            <a:extLst>
+              <a:ext uri="{FF2B5EF4-FFF2-40B4-BE49-F238E27FC236}">
+                <a16:creationId xmlns:a16="http://schemas.microsoft.com/office/drawing/2014/main" id="{A9AEAC8F-279A-415C-A246-FC4C813EDDD0}"/>
+              </a:ext>
+            </a:extLst>
+          </p:cNvPr>
+          <p:cNvCxnSpPr>
+            <a:cxnSpLocks/>
+            <a:stCxn id="170" idx="2"/>
+          </p:cNvCxnSpPr>
+          <p:nvPr/>
+        </p:nvCxnSpPr>
+        <p:spPr>
+          <a:xfrm rot="5400000" flipH="1" flipV="1">
+            <a:off x="6457607" y="997567"/>
+            <a:ext cx="782378" cy="6028980"/>
+          </a:xfrm>
+          <a:prstGeom prst="bentConnector4">
+            <a:avLst>
+              <a:gd name="adj1" fmla="val -118498"/>
+              <a:gd name="adj2" fmla="val 99986"/>
+            </a:avLst>
+          </a:prstGeom>
+          <a:ln w="63500">
+            <a:solidFill>
+              <a:srgbClr val="7030A0"/>
+            </a:solidFill>
+            <a:prstDash val="sysDot"/>
+            <a:tailEnd type="triangle"/>
+          </a:ln>
+        </p:spPr>
+        <p:style>
+          <a:lnRef idx="1">
+            <a:schemeClr val="accent1"/>
+          </a:lnRef>
+          <a:fillRef idx="0">
+            <a:schemeClr val="accent1"/>
+          </a:fillRef>
+          <a:effectRef idx="0">
+            <a:schemeClr val="accent1"/>
+          </a:effectRef>
+          <a:fontRef idx="minor">
+            <a:schemeClr val="tx1"/>
+          </a:fontRef>
+        </p:style>
+      </p:cxnSp>
+      <p:cxnSp>
+        <p:nvCxnSpPr>
+          <p:cNvPr id="221" name="Connector: Elbow 220">
+            <a:extLst>
+              <a:ext uri="{FF2B5EF4-FFF2-40B4-BE49-F238E27FC236}">
+                <a16:creationId xmlns:a16="http://schemas.microsoft.com/office/drawing/2014/main" id="{B258F43B-46EF-4D29-ADAA-33D8CF088676}"/>
+              </a:ext>
+            </a:extLst>
+          </p:cNvPr>
+          <p:cNvCxnSpPr>
+            <a:cxnSpLocks/>
+            <a:stCxn id="6" idx="2"/>
+            <a:endCxn id="52" idx="0"/>
+          </p:cNvCxnSpPr>
+          <p:nvPr/>
+        </p:nvCxnSpPr>
+        <p:spPr>
+          <a:xfrm rot="5400000">
+            <a:off x="3675955" y="47207"/>
+            <a:ext cx="1669336" cy="4095556"/>
+          </a:xfrm>
+          <a:prstGeom prst="bentConnector3">
+            <a:avLst>
+              <a:gd name="adj1" fmla="val 21090"/>
+            </a:avLst>
+          </a:prstGeom>
+          <a:ln w="76200">
+            <a:solidFill>
+              <a:srgbClr val="7030A0"/>
+            </a:solidFill>
+            <a:prstDash val="sysDot"/>
+            <a:tailEnd type="triangle"/>
+          </a:ln>
+        </p:spPr>
+        <p:style>
+          <a:lnRef idx="1">
+            <a:schemeClr val="accent1"/>
+          </a:lnRef>
+          <a:fillRef idx="0">
+            <a:schemeClr val="accent1"/>
+          </a:fillRef>
+          <a:effectRef idx="0">
+            <a:schemeClr val="accent1"/>
+          </a:effectRef>
+          <a:fontRef idx="minor">
+            <a:schemeClr val="tx1"/>
+          </a:fontRef>
+        </p:style>
+      </p:cxnSp>
     </p:spTree>
     <p:extLst>
       <p:ext uri="{BB962C8B-B14F-4D97-AF65-F5344CB8AC3E}">

</xml_diff>